<commit_message>
Minor edits to attention presentation & notebook.
</commit_message>
<xml_diff>
--- a/presentations/02_transformers_attention.pptx
+++ b/presentations/02_transformers_attention.pptx
@@ -9,28 +9,28 @@
   </p:notesMasterIdLst>
   <p:sldIdLst>
     <p:sldId id="326" r:id="rId2"/>
-    <p:sldId id="352" r:id="rId3"/>
-    <p:sldId id="336" r:id="rId4"/>
-    <p:sldId id="335" r:id="rId5"/>
-    <p:sldId id="350" r:id="rId6"/>
-    <p:sldId id="308" r:id="rId7"/>
-    <p:sldId id="351" r:id="rId8"/>
-    <p:sldId id="354" r:id="rId9"/>
-    <p:sldId id="355" r:id="rId10"/>
-    <p:sldId id="356" r:id="rId11"/>
-    <p:sldId id="357" r:id="rId12"/>
-    <p:sldId id="345" r:id="rId13"/>
-    <p:sldId id="349" r:id="rId14"/>
-    <p:sldId id="279" r:id="rId15"/>
-    <p:sldId id="339" r:id="rId16"/>
-    <p:sldId id="340" r:id="rId17"/>
-    <p:sldId id="358" r:id="rId18"/>
-    <p:sldId id="359" r:id="rId19"/>
-    <p:sldId id="361" r:id="rId20"/>
-    <p:sldId id="362" r:id="rId21"/>
-    <p:sldId id="353" r:id="rId22"/>
-    <p:sldId id="341" r:id="rId23"/>
-    <p:sldId id="344" r:id="rId24"/>
+    <p:sldId id="336" r:id="rId3"/>
+    <p:sldId id="335" r:id="rId4"/>
+    <p:sldId id="350" r:id="rId5"/>
+    <p:sldId id="308" r:id="rId6"/>
+    <p:sldId id="351" r:id="rId7"/>
+    <p:sldId id="354" r:id="rId8"/>
+    <p:sldId id="355" r:id="rId9"/>
+    <p:sldId id="356" r:id="rId10"/>
+    <p:sldId id="357" r:id="rId11"/>
+    <p:sldId id="345" r:id="rId12"/>
+    <p:sldId id="349" r:id="rId13"/>
+    <p:sldId id="279" r:id="rId14"/>
+    <p:sldId id="339" r:id="rId15"/>
+    <p:sldId id="340" r:id="rId16"/>
+    <p:sldId id="358" r:id="rId17"/>
+    <p:sldId id="359" r:id="rId18"/>
+    <p:sldId id="361" r:id="rId19"/>
+    <p:sldId id="362" r:id="rId20"/>
+    <p:sldId id="353" r:id="rId21"/>
+    <p:sldId id="341" r:id="rId22"/>
+    <p:sldId id="344" r:id="rId23"/>
+    <p:sldId id="352" r:id="rId24"/>
     <p:sldId id="348" r:id="rId25"/>
   </p:sldIdLst>
   <p:sldSz cx="12192000" cy="6858000"/>
@@ -231,7 +231,7 @@
           <a:p>
             <a:fld id="{FD93C9B2-20F6-4DB1-B471-224337D0AC79}" type="datetimeFigureOut">
               <a:rPr lang="en-US" smtClean="0"/>
-              <a:t>11/10/2022</a:t>
+              <a:t>11/17/2022</a:t>
             </a:fld>
             <a:endParaRPr lang="en-US"/>
           </a:p>
@@ -663,7 +663,7 @@
           <a:p>
             <a:fld id="{3148858F-F1DB-4027-9C85-CCA6849540DD}" type="slidenum">
               <a:rPr lang="en-US" smtClean="0"/>
-              <a:t>11</a:t>
+              <a:t>10</a:t>
             </a:fld>
             <a:endParaRPr lang="en-US"/>
           </a:p>
@@ -865,7 +865,7 @@
           <a:p>
             <a:fld id="{3148858F-F1DB-4027-9C85-CCA6849540DD}" type="slidenum">
               <a:rPr lang="en-US" smtClean="0"/>
-              <a:t>12</a:t>
+              <a:t>11</a:t>
             </a:fld>
             <a:endParaRPr lang="en-US"/>
           </a:p>
@@ -957,7 +957,7 @@
                 <a:effectLst/>
                 <a:latin typeface="charter"/>
               </a:rPr>
-              <a:t>is that a specific word in a sequence can be viewed in multiple ways.  Consider, for example, the three questions asked here, with each </a:t>
+              <a:t>is that a specific word in a sequence can be viewed in multiple ways.  Consider, for example, the three questions asked here, with three </a:t>
             </a:r>
             <a:r>
               <a:rPr lang="en-US" b="1" i="0" dirty="0">
@@ -967,7 +967,7 @@
                 <a:effectLst/>
                 <a:latin typeface="charter"/>
               </a:rPr>
-              <a:t>attention head </a:t>
+              <a:t>attention heads</a:t>
             </a:r>
             <a:r>
               <a:rPr lang="en-US" b="0" i="0" dirty="0">
@@ -977,30 +977,7 @@
                 <a:effectLst/>
                 <a:latin typeface="charter"/>
               </a:rPr>
-              <a:t>being a different color – red, green, blue.   As shown here, attention changes, depending on the head and the question it asks.  With the green head, attention is on the first word, in response to the question of who did the action.  With the red head, attention shifts to the second word in response to the question – ‘Did what?’  And finally, the last word is the focus of attention in the blue head, in response to the question – ‘To whom?’.</a:t>
-            </a:r>
-          </a:p>
-          <a:p>
-            <a:pPr algn="l"/>
-            <a:endParaRPr lang="en-US" b="0" i="0" dirty="0">
-              <a:solidFill>
-                <a:srgbClr val="292929"/>
-              </a:solidFill>
-              <a:effectLst/>
-              <a:latin typeface="charter"/>
-            </a:endParaRPr>
-          </a:p>
-          <a:p>
-            <a:pPr algn="l"/>
-            <a:r>
-              <a:rPr lang="en-US" b="0" i="0" dirty="0">
-                <a:solidFill>
-                  <a:srgbClr val="292929"/>
-                </a:solidFill>
-                <a:effectLst/>
-                <a:latin typeface="charter"/>
-              </a:rPr>
-              <a:t>The translation of a given word to another language will vary, depending on the answer to each question.</a:t>
+              <a:t>.   As shown here, attention changes, depending on the head and the question it asks.  With HEAD ONE, attention is on the first word, in response to the question of who did the action.  Green predominates.  With HEAD TWO, attention shifts to the second word in response to the question – ‘Did what?’  And finally, the last word is the focus of attention in HEAD THREE, in response to the question – ‘To whom?’.</a:t>
             </a:r>
           </a:p>
           <a:p>
@@ -1160,7 +1137,7 @@
           <a:p>
             <a:fld id="{3148858F-F1DB-4027-9C85-CCA6849540DD}" type="slidenum">
               <a:rPr lang="en-US" smtClean="0"/>
-              <a:t>13</a:t>
+              <a:t>12</a:t>
             </a:fld>
             <a:endParaRPr lang="en-US"/>
           </a:p>
@@ -1261,7 +1238,7 @@
           <a:p>
             <a:fld id="{3148858F-F1DB-4027-9C85-CCA6849540DD}" type="slidenum">
               <a:rPr lang="en-US" smtClean="0"/>
-              <a:t>14</a:t>
+              <a:t>13</a:t>
             </a:fld>
             <a:endParaRPr lang="en-US"/>
           </a:p>
@@ -1482,7 +1459,7 @@
           <a:p>
             <a:fld id="{3148858F-F1DB-4027-9C85-CCA6849540DD}" type="slidenum">
               <a:rPr lang="en-US" smtClean="0"/>
-              <a:t>15</a:t>
+              <a:t>14</a:t>
             </a:fld>
             <a:endParaRPr lang="en-US"/>
           </a:p>
@@ -1634,7 +1611,7 @@
           <a:p>
             <a:fld id="{3148858F-F1DB-4027-9C85-CCA6849540DD}" type="slidenum">
               <a:rPr lang="en-US" smtClean="0"/>
-              <a:t>16</a:t>
+              <a:t>15</a:t>
             </a:fld>
             <a:endParaRPr lang="en-US"/>
           </a:p>
@@ -1751,7 +1728,7 @@
           <a:p>
             <a:fld id="{3148858F-F1DB-4027-9C85-CCA6849540DD}" type="slidenum">
               <a:rPr lang="en-US" smtClean="0"/>
-              <a:t>17</a:t>
+              <a:t>16</a:t>
             </a:fld>
             <a:endParaRPr lang="en-US"/>
           </a:p>
@@ -1825,7 +1802,7 @@
           <a:p>
             <a:r>
               <a:rPr lang="en-US" dirty="0"/>
-              <a:t>The next two layers are usually referred to collectively as a </a:t>
+              <a:t>The next two layers are a </a:t>
             </a:r>
             <a:r>
               <a:rPr lang="en-US" b="1" dirty="0"/>
@@ -1855,7 +1832,7 @@
           <a:p>
             <a:fld id="{3148858F-F1DB-4027-9C85-CCA6849540DD}" type="slidenum">
               <a:rPr lang="en-US" smtClean="0"/>
-              <a:t>18</a:t>
+              <a:t>17</a:t>
             </a:fld>
             <a:endParaRPr lang="en-US"/>
           </a:p>
@@ -1960,7 +1937,7 @@
           <a:p>
             <a:fld id="{3148858F-F1DB-4027-9C85-CCA6849540DD}" type="slidenum">
               <a:rPr lang="en-US" smtClean="0"/>
-              <a:t>19</a:t>
+              <a:t>18</a:t>
             </a:fld>
             <a:endParaRPr lang="en-US"/>
           </a:p>
@@ -2048,7 +2025,7 @@
                 <a:effectLst/>
                 <a:latin typeface="charter"/>
               </a:rPr>
-              <a:t>We end this mini-lecture with a simulation.  Here’s what attention looks like in action – with the decoder accessing hidden state 1, 2, and 3 at each step of the decoding process.</a:t>
+              <a:t>And here’s what attention looks like in a simulation – with the decoder accessing hidden state 1, 2, and 3 at each step of the decoding process.</a:t>
             </a:r>
           </a:p>
           <a:p>
@@ -2122,7 +2099,7 @@
           <a:p>
             <a:fld id="{3148858F-F1DB-4027-9C85-CCA6849540DD}" type="slidenum">
               <a:rPr lang="en-US" smtClean="0"/>
-              <a:t>20</a:t>
+              <a:t>19</a:t>
             </a:fld>
             <a:endParaRPr lang="en-US"/>
           </a:p>
@@ -2188,7 +2165,7 @@
             <a:pPr algn="l"/>
             <a:r>
               <a:rPr lang="en-US" dirty="0"/>
-              <a:t>In our last session, we discussed three transformer building blocks: 1) Layer Norm, 2) Positional Encoding, and 3) Skip Connections.  Word embeddings, of course, were covered in our NLP workshop series.  In this session, we focus on attention.</a:t>
+              <a:t>In our last session, we discussed three transformer building blocks: 1) Layer Norm, 2) Positional Encoding, and 3) Skip Connections.  And we covered word embeddings in our NLP workshop series.  In this session, we focus on attention.</a:t>
             </a:r>
           </a:p>
         </p:txBody>
@@ -2210,7 +2187,7 @@
           <a:p>
             <a:fld id="{3148858F-F1DB-4027-9C85-CCA6849540DD}" type="slidenum">
               <a:rPr lang="en-US" smtClean="0"/>
-              <a:t>3</a:t>
+              <a:t>2</a:t>
             </a:fld>
             <a:endParaRPr lang="en-US"/>
           </a:p>
@@ -2273,6 +2250,72 @@
           <a:bodyPr/>
           <a:lstStyle/>
           <a:p>
+            <a:r>
+              <a:rPr lang="en-US" dirty="0"/>
+              <a:t>And finally, here are some of the icons that you may see in a transformer block diagram:</a:t>
+            </a:r>
+          </a:p>
+          <a:p>
+            <a:endParaRPr lang="en-US" dirty="0"/>
+          </a:p>
+          <a:p>
+            <a:pPr marL="228600" indent="-228600">
+              <a:buAutoNum type="arabicPeriod"/>
+            </a:pPr>
+            <a:r>
+              <a:rPr lang="en-US" dirty="0"/>
+              <a:t>Self-Attention</a:t>
+            </a:r>
+          </a:p>
+          <a:p>
+            <a:pPr marL="228600" indent="-228600">
+              <a:buAutoNum type="arabicPeriod"/>
+            </a:pPr>
+            <a:r>
+              <a:rPr lang="en-US" dirty="0"/>
+              <a:t>Multi-Head Self Attention</a:t>
+            </a:r>
+          </a:p>
+          <a:p>
+            <a:pPr marL="228600" indent="-228600">
+              <a:buAutoNum type="arabicPeriod"/>
+            </a:pPr>
+            <a:r>
+              <a:rPr lang="en-US" dirty="0"/>
+              <a:t>Q/KV Attention</a:t>
+            </a:r>
+          </a:p>
+          <a:p>
+            <a:pPr marL="228600" indent="-228600">
+              <a:buAutoNum type="arabicPeriod"/>
+            </a:pPr>
+            <a:r>
+              <a:rPr lang="en-US" dirty="0"/>
+              <a:t>Multi-Head Q/KV Self Attention</a:t>
+            </a:r>
+          </a:p>
+          <a:p>
+            <a:pPr marL="228600" indent="-228600">
+              <a:buAutoNum type="arabicPeriod"/>
+            </a:pPr>
+            <a:r>
+              <a:rPr lang="en-US" dirty="0"/>
+              <a:t>Embedding</a:t>
+            </a:r>
+          </a:p>
+          <a:p>
+            <a:pPr marL="228600" indent="-228600">
+              <a:buAutoNum type="arabicPeriod"/>
+            </a:pPr>
+            <a:r>
+              <a:rPr lang="en-US" dirty="0"/>
+              <a:t>Positional Embedding</a:t>
+            </a:r>
+          </a:p>
+          <a:p>
+            <a:pPr marL="0" indent="0">
+              <a:buNone/>
+            </a:pPr>
             <a:endParaRPr lang="en-US" dirty="0"/>
           </a:p>
         </p:txBody>
@@ -2294,7 +2337,7 @@
           <a:p>
             <a:fld id="{3148858F-F1DB-4027-9C85-CCA6849540DD}" type="slidenum">
               <a:rPr lang="en-US" smtClean="0"/>
-              <a:t>21</a:t>
+              <a:t>20</a:t>
             </a:fld>
             <a:endParaRPr lang="en-US"/>
           </a:p>
@@ -2395,7 +2438,7 @@
           <a:p>
             <a:fld id="{3148858F-F1DB-4027-9C85-CCA6849540DD}" type="slidenum">
               <a:rPr lang="en-US" smtClean="0"/>
-              <a:t>22</a:t>
+              <a:t>21</a:t>
             </a:fld>
             <a:endParaRPr lang="en-US"/>
           </a:p>
@@ -2496,7 +2539,7 @@
           <a:p>
             <a:fld id="{3148858F-F1DB-4027-9C85-CCA6849540DD}" type="slidenum">
               <a:rPr lang="en-US" smtClean="0"/>
-              <a:t>23</a:t>
+              <a:t>22</a:t>
             </a:fld>
             <a:endParaRPr lang="en-US"/>
           </a:p>
@@ -2808,7 +2851,7 @@
           <a:p>
             <a:fld id="{3148858F-F1DB-4027-9C85-CCA6849540DD}" type="slidenum">
               <a:rPr lang="en-US" smtClean="0"/>
-              <a:t>4</a:t>
+              <a:t>3</a:t>
             </a:fld>
             <a:endParaRPr lang="en-US"/>
           </a:p>
@@ -2902,7 +2945,7 @@
           <a:p>
             <a:fld id="{3148858F-F1DB-4027-9C85-CCA6849540DD}" type="slidenum">
               <a:rPr lang="en-US" smtClean="0"/>
-              <a:t>5</a:t>
+              <a:t>4</a:t>
             </a:fld>
             <a:endParaRPr lang="en-US"/>
           </a:p>
@@ -3012,7 +3055,7 @@
               <a:rPr lang="en-US" dirty="0">
                 <a:latin typeface="+mn-lt"/>
               </a:rPr>
-              <a:t>So, how does a reader arrive at a correct definition?  In each sentence, the key is to figure out what other words influence the meaning of “flies” and focus on just those words while ignoring the others.   We then </a:t>
+              <a:t>So, how do we arrive at a correct definition?  In each sentence, the key is to figure out what other words influence the meaning of “flies” and focus on just those words while ignoring the others.   We then </a:t>
             </a:r>
             <a:r>
               <a:rPr lang="en-US" b="1" dirty="0">
@@ -3124,7 +3167,7 @@
           <a:p>
             <a:fld id="{3148858F-F1DB-4027-9C85-CCA6849540DD}" type="slidenum">
               <a:rPr lang="en-US" smtClean="0"/>
-              <a:t>6</a:t>
+              <a:t>5</a:t>
             </a:fld>
             <a:endParaRPr lang="en-US"/>
           </a:p>
@@ -3292,7 +3335,7 @@
             </a:pPr>
             <a:r>
               <a:rPr lang="en-US" dirty="0"/>
-              <a:t>The context is quite different in the second sentence.  The self-attention color chips in this stack are blends of purple, orange, and red.  Hence, the words “fruit” and “banana” play an influential role in this case, resulting in the word embedding for “insect”.</a:t>
+              <a:t>The context is quite different in the second sentence.  Here the self-attention color chips are blends of purple, orange, and red.  This indicates that the words “fruit” and “banana” play an influential role here, resulting in the word embedding for “insect”.</a:t>
             </a:r>
           </a:p>
           <a:p>
@@ -3334,7 +3377,7 @@
           <a:p>
             <a:fld id="{3148858F-F1DB-4027-9C85-CCA6849540DD}" type="slidenum">
               <a:rPr lang="en-US" smtClean="0"/>
-              <a:t>7</a:t>
+              <a:t>6</a:t>
             </a:fld>
             <a:endParaRPr lang="en-US"/>
           </a:p>
@@ -3397,6 +3440,12 @@
           <a:bodyPr/>
           <a:lstStyle/>
           <a:p>
+            <a:r>
+              <a:rPr lang="en-US" dirty="0"/>
+              <a:t>Now that we’ve seen how transformers work at a higher level, let’s zoom in and take a closer look at the architecture. </a:t>
+            </a:r>
+          </a:p>
+          <a:p>
             <a:endParaRPr lang="en-US" dirty="0"/>
           </a:p>
           <a:p>
@@ -3432,7 +3481,7 @@
             </a:pPr>
             <a:r>
               <a:rPr lang="en-US" dirty="0"/>
-              <a:t>The scoring function (gold) compares two tensors Q &amp; V to determine how alike, arrives at a likeness score, and then uses that score to scale V.</a:t>
+              <a:t>The scoring function (gold) compares two tensors Q &amp; V to determine how similar they are, calculates a likeness score, and then uses that score to scale V.</a:t>
             </a:r>
           </a:p>
           <a:p>
@@ -3447,7 +3496,7 @@
             </a:pPr>
             <a:r>
               <a:rPr lang="en-US" dirty="0"/>
-              <a:t>In practice, we compare the query for “flies” against the key for every word in the sentence, including “flies” itself.  We compare the query and key to see how alike they are.  And we do this with a scoring function, shown here as an S inside a yellow circle.  This function compares two tensors and produces a single number.  The more alike the two tensors are, the larger the number.  The output from the scoring function is then used to determine how much of the value for “arrow” makes it into the final output.</a:t>
+              <a:t>Let’s summarize the process.  We compare the query for “flies” against the key for every word in the sentence, including “flies” itself.  We compare the query and key to see how alike they are.  And we do this with a scoring function.  This function compares two tensors and produces a single number.  The more similar the two tensors are, the larger the number.  The output from the scoring function is then used to determine how much of the value for “arrow” makes it into the final output.</a:t>
             </a:r>
           </a:p>
         </p:txBody>
@@ -3469,7 +3518,7 @@
           <a:p>
             <a:fld id="{3148858F-F1DB-4027-9C85-CCA6849540DD}" type="slidenum">
               <a:rPr lang="en-US" smtClean="0"/>
-              <a:t>8</a:t>
+              <a:t>7</a:t>
             </a:fld>
             <a:endParaRPr lang="en-US"/>
           </a:p>
@@ -3534,7 +3583,7 @@
           <a:p>
             <a:r>
               <a:rPr lang="en-US" dirty="0"/>
-              <a:t>Let’s now see what it looks like to apply self-attention to all the words in our sentence.  As was the case in the last slide, only three neural networks do the work – one each to compute the query, key, and value tensors.  The scoring function determines how much value to include of each word.  The dashed line represents a softmax function applied to all the scores, followed by a division.  These two operations keep the numbers coming out of the scoring functions from getting too big or too small.  And finally, we sum up all the scaled values to get a new tensor for flies.</a:t>
+              <a:t>Let’s now see what it looks like to apply self-attention to all the words in our sentence.  As was the case in the last slide, only three neural networks do the work – one each to compute the query, key, and value tensors.  The scoring function determines how much value to include of each word.  The dashed line represents a softmax function applied to all the scores, followed by a division.  These two operations keep the outputs from the scoring functions from getting too big or too small.  And finally, we sum up all the scaled values to get a new tensor for flies.</a:t>
             </a:r>
           </a:p>
         </p:txBody>
@@ -3556,7 +3605,7 @@
           <a:p>
             <a:fld id="{3148858F-F1DB-4027-9C85-CCA6849540DD}" type="slidenum">
               <a:rPr lang="en-US" smtClean="0"/>
-              <a:t>9</a:t>
+              <a:t>8</a:t>
             </a:fld>
             <a:endParaRPr lang="en-US"/>
           </a:p>
@@ -3621,7 +3670,7 @@
           <a:p>
             <a:r>
               <a:rPr lang="en-US" dirty="0"/>
-              <a:t>Note: the self-attention process diagrammed in the last slide is applied to </a:t>
+              <a:t>The self-attention process diagrammed in the last slide is applied to </a:t>
             </a:r>
             <a:r>
               <a:rPr lang="en-US" b="1" dirty="0"/>
@@ -3637,7 +3686,7 @@
             </a:r>
             <a:r>
               <a:rPr lang="en-US" dirty="0"/>
-              <a:t>.   In other words, the transformer architecture takes full advantage of parallel computing capabilities when available.  That means that each of the four blocks above is run as a separate process at the same time as the others.</a:t>
+              <a:t>.   In other words, the transformer architecture takes full advantage of parallel computing capabilities when available.  That means that each of the four blocks shown here is run as a separate process at the same time as the others.</a:t>
             </a:r>
           </a:p>
         </p:txBody>
@@ -3659,7 +3708,7 @@
           <a:p>
             <a:fld id="{3148858F-F1DB-4027-9C85-CCA6849540DD}" type="slidenum">
               <a:rPr lang="en-US" smtClean="0"/>
-              <a:t>10</a:t>
+              <a:t>9</a:t>
             </a:fld>
             <a:endParaRPr lang="en-US"/>
           </a:p>
@@ -3825,7 +3874,7 @@
           <a:p>
             <a:fld id="{C3F78080-8D0A-4BE8-A5B4-CB115102D524}" type="datetimeFigureOut">
               <a:rPr lang="en-US" smtClean="0"/>
-              <a:t>11/10/2022</a:t>
+              <a:t>11/17/2022</a:t>
             </a:fld>
             <a:endParaRPr lang="en-US"/>
           </a:p>
@@ -4023,7 +4072,7 @@
           <a:p>
             <a:fld id="{C3F78080-8D0A-4BE8-A5B4-CB115102D524}" type="datetimeFigureOut">
               <a:rPr lang="en-US" smtClean="0"/>
-              <a:t>11/10/2022</a:t>
+              <a:t>11/17/2022</a:t>
             </a:fld>
             <a:endParaRPr lang="en-US"/>
           </a:p>
@@ -4231,7 +4280,7 @@
           <a:p>
             <a:fld id="{C3F78080-8D0A-4BE8-A5B4-CB115102D524}" type="datetimeFigureOut">
               <a:rPr lang="en-US" smtClean="0"/>
-              <a:t>11/10/2022</a:t>
+              <a:t>11/17/2022</a:t>
             </a:fld>
             <a:endParaRPr lang="en-US"/>
           </a:p>
@@ -4429,7 +4478,7 @@
           <a:p>
             <a:fld id="{C3F78080-8D0A-4BE8-A5B4-CB115102D524}" type="datetimeFigureOut">
               <a:rPr lang="en-US" smtClean="0"/>
-              <a:t>11/10/2022</a:t>
+              <a:t>11/17/2022</a:t>
             </a:fld>
             <a:endParaRPr lang="en-US"/>
           </a:p>
@@ -4704,7 +4753,7 @@
           <a:p>
             <a:fld id="{C3F78080-8D0A-4BE8-A5B4-CB115102D524}" type="datetimeFigureOut">
               <a:rPr lang="en-US" smtClean="0"/>
-              <a:t>11/10/2022</a:t>
+              <a:t>11/17/2022</a:t>
             </a:fld>
             <a:endParaRPr lang="en-US"/>
           </a:p>
@@ -4969,7 +5018,7 @@
           <a:p>
             <a:fld id="{C3F78080-8D0A-4BE8-A5B4-CB115102D524}" type="datetimeFigureOut">
               <a:rPr lang="en-US" smtClean="0"/>
-              <a:t>11/10/2022</a:t>
+              <a:t>11/17/2022</a:t>
             </a:fld>
             <a:endParaRPr lang="en-US"/>
           </a:p>
@@ -5381,7 +5430,7 @@
           <a:p>
             <a:fld id="{C3F78080-8D0A-4BE8-A5B4-CB115102D524}" type="datetimeFigureOut">
               <a:rPr lang="en-US" smtClean="0"/>
-              <a:t>11/10/2022</a:t>
+              <a:t>11/17/2022</a:t>
             </a:fld>
             <a:endParaRPr lang="en-US"/>
           </a:p>
@@ -5522,7 +5571,7 @@
           <a:p>
             <a:fld id="{C3F78080-8D0A-4BE8-A5B4-CB115102D524}" type="datetimeFigureOut">
               <a:rPr lang="en-US" smtClean="0"/>
-              <a:t>11/10/2022</a:t>
+              <a:t>11/17/2022</a:t>
             </a:fld>
             <a:endParaRPr lang="en-US"/>
           </a:p>
@@ -5635,7 +5684,7 @@
           <a:p>
             <a:fld id="{C3F78080-8D0A-4BE8-A5B4-CB115102D524}" type="datetimeFigureOut">
               <a:rPr lang="en-US" smtClean="0"/>
-              <a:t>11/10/2022</a:t>
+              <a:t>11/17/2022</a:t>
             </a:fld>
             <a:endParaRPr lang="en-US"/>
           </a:p>
@@ -5946,7 +5995,7 @@
           <a:p>
             <a:fld id="{C3F78080-8D0A-4BE8-A5B4-CB115102D524}" type="datetimeFigureOut">
               <a:rPr lang="en-US" smtClean="0"/>
-              <a:t>11/10/2022</a:t>
+              <a:t>11/17/2022</a:t>
             </a:fld>
             <a:endParaRPr lang="en-US"/>
           </a:p>
@@ -6234,7 +6283,7 @@
           <a:p>
             <a:fld id="{C3F78080-8D0A-4BE8-A5B4-CB115102D524}" type="datetimeFigureOut">
               <a:rPr lang="en-US" smtClean="0"/>
-              <a:t>11/10/2022</a:t>
+              <a:t>11/17/2022</a:t>
             </a:fld>
             <a:endParaRPr lang="en-US"/>
           </a:p>
@@ -6475,7 +6524,7 @@
           <a:p>
             <a:fld id="{C3F78080-8D0A-4BE8-A5B4-CB115102D524}" type="datetimeFigureOut">
               <a:rPr lang="en-US" smtClean="0"/>
-              <a:t>11/10/2022</a:t>
+              <a:t>11/17/2022</a:t>
             </a:fld>
             <a:endParaRPr lang="en-US"/>
           </a:p>
@@ -7014,449 +7063,6 @@
       </p:grpSpPr>
       <p:pic>
         <p:nvPicPr>
-          <p:cNvPr id="9" name="Picture 8">
-            <a:extLst>
-              <a:ext uri="{FF2B5EF4-FFF2-40B4-BE49-F238E27FC236}">
-                <a16:creationId xmlns:a16="http://schemas.microsoft.com/office/drawing/2014/main" id="{9C45DAD3-D954-0FF1-8F79-DBF6100A0C2F}"/>
-              </a:ext>
-            </a:extLst>
-          </p:cNvPr>
-          <p:cNvPicPr>
-            <a:picLocks noChangeAspect="1"/>
-          </p:cNvPicPr>
-          <p:nvPr/>
-        </p:nvPicPr>
-        <p:blipFill>
-          <a:blip r:embed="rId3"/>
-          <a:stretch>
-            <a:fillRect/>
-          </a:stretch>
-        </p:blipFill>
-        <p:spPr>
-          <a:xfrm>
-            <a:off x="1946275" y="117475"/>
-            <a:ext cx="8299450" cy="6623050"/>
-          </a:xfrm>
-          <a:prstGeom prst="rect">
-            <a:avLst/>
-          </a:prstGeom>
-        </p:spPr>
-      </p:pic>
-      <p:sp>
-        <p:nvSpPr>
-          <p:cNvPr id="3" name="TextBox 2">
-            <a:extLst>
-              <a:ext uri="{FF2B5EF4-FFF2-40B4-BE49-F238E27FC236}">
-                <a16:creationId xmlns:a16="http://schemas.microsoft.com/office/drawing/2014/main" id="{11F9E0E5-C8EC-B69F-C9F3-E277ADA47CB8}"/>
-              </a:ext>
-            </a:extLst>
-          </p:cNvPr>
-          <p:cNvSpPr txBox="1"/>
-          <p:nvPr/>
-        </p:nvSpPr>
-        <p:spPr>
-          <a:xfrm>
-            <a:off x="0" y="6550223"/>
-            <a:ext cx="12192000" cy="307777"/>
-          </a:xfrm>
-          <a:prstGeom prst="rect">
-            <a:avLst/>
-          </a:prstGeom>
-          <a:noFill/>
-        </p:spPr>
-        <p:txBody>
-          <a:bodyPr wrap="square" rtlCol="0">
-            <a:spAutoFit/>
-          </a:bodyPr>
-          <a:lstStyle/>
-          <a:p>
-            <a:r>
-              <a:rPr lang="en-US" sz="1400" dirty="0">
-                <a:solidFill>
-                  <a:schemeClr val="tx1">
-                    <a:lumMod val="65000"/>
-                    <a:lumOff val="35000"/>
-                  </a:schemeClr>
-                </a:solidFill>
-                <a:latin typeface="+mj-lt"/>
-                <a:ea typeface="Verdana" panose="020B0604030504040204" pitchFamily="34" charset="0"/>
-              </a:rPr>
-              <a:t>Story Source: Glassner, A. (2021). </a:t>
-            </a:r>
-            <a:r>
-              <a:rPr lang="en-US" sz="1400" i="1" dirty="0">
-                <a:solidFill>
-                  <a:schemeClr val="tx1">
-                    <a:lumMod val="65000"/>
-                    <a:lumOff val="35000"/>
-                  </a:schemeClr>
-                </a:solidFill>
-                <a:latin typeface="+mj-lt"/>
-                <a:ea typeface="Verdana" panose="020B0604030504040204" pitchFamily="34" charset="0"/>
-              </a:rPr>
-              <a:t>Deep learning: A visual approach</a:t>
-            </a:r>
-            <a:r>
-              <a:rPr lang="en-US" sz="1400" dirty="0">
-                <a:solidFill>
-                  <a:schemeClr val="tx1">
-                    <a:lumMod val="65000"/>
-                    <a:lumOff val="35000"/>
-                  </a:schemeClr>
-                </a:solidFill>
-                <a:latin typeface="+mj-lt"/>
-                <a:ea typeface="Verdana" panose="020B0604030504040204" pitchFamily="34" charset="0"/>
-              </a:rPr>
-              <a:t>. </a:t>
-            </a:r>
-            <a:r>
-              <a:rPr lang="en-US" sz="1400" b="0" i="0" dirty="0">
-                <a:solidFill>
-                  <a:schemeClr val="tx1">
-                    <a:lumMod val="65000"/>
-                    <a:lumOff val="35000"/>
-                  </a:schemeClr>
-                </a:solidFill>
-                <a:effectLst/>
-                <a:latin typeface="+mj-lt"/>
-                <a:ea typeface="Verdana" panose="020B0604030504040204" pitchFamily="34" charset="0"/>
-              </a:rPr>
-              <a:t>San Francisco, CA: No Starch Press. (Chapter </a:t>
-            </a:r>
-            <a:r>
-              <a:rPr lang="en-US" sz="1400" dirty="0">
-                <a:solidFill>
-                  <a:schemeClr val="tx1">
-                    <a:lumMod val="65000"/>
-                    <a:lumOff val="35000"/>
-                  </a:schemeClr>
-                </a:solidFill>
-                <a:latin typeface="+mj-lt"/>
-                <a:ea typeface="Verdana" panose="020B0604030504040204" pitchFamily="34" charset="0"/>
-              </a:rPr>
-              <a:t>20</a:t>
-            </a:r>
-            <a:r>
-              <a:rPr lang="en-US" sz="1400" b="0" i="0" dirty="0">
-                <a:solidFill>
-                  <a:schemeClr val="tx1">
-                    <a:lumMod val="65000"/>
-                    <a:lumOff val="35000"/>
-                  </a:schemeClr>
-                </a:solidFill>
-                <a:effectLst/>
-                <a:latin typeface="+mj-lt"/>
-                <a:ea typeface="Verdana" panose="020B0604030504040204" pitchFamily="34" charset="0"/>
-              </a:rPr>
-              <a:t>)</a:t>
-            </a:r>
-            <a:endParaRPr lang="en-US" sz="1400" dirty="0">
-              <a:solidFill>
-                <a:schemeClr val="tx1">
-                  <a:lumMod val="65000"/>
-                  <a:lumOff val="35000"/>
-                </a:schemeClr>
-              </a:solidFill>
-              <a:latin typeface="+mj-lt"/>
-              <a:ea typeface="Verdana" panose="020B0604030504040204" pitchFamily="34" charset="0"/>
-            </a:endParaRPr>
-          </a:p>
-        </p:txBody>
-      </p:sp>
-      <p:graphicFrame>
-        <p:nvGraphicFramePr>
-          <p:cNvPr id="4" name="Table 9">
-            <a:extLst>
-              <a:ext uri="{FF2B5EF4-FFF2-40B4-BE49-F238E27FC236}">
-                <a16:creationId xmlns:a16="http://schemas.microsoft.com/office/drawing/2014/main" id="{D9A2C165-E4BD-3D78-6733-92FC682CF65E}"/>
-              </a:ext>
-            </a:extLst>
-          </p:cNvPr>
-          <p:cNvGraphicFramePr>
-            <a:graphicFrameLocks noGrp="1"/>
-          </p:cNvGraphicFramePr>
-          <p:nvPr>
-            <p:extLst>
-              <p:ext uri="{D42A27DB-BD31-4B8C-83A1-F6EECF244321}">
-                <p14:modId xmlns:p14="http://schemas.microsoft.com/office/powerpoint/2010/main" val="1192574315"/>
-              </p:ext>
-            </p:extLst>
-          </p:nvPr>
-        </p:nvGraphicFramePr>
-        <p:xfrm>
-          <a:off x="95693" y="165817"/>
-          <a:ext cx="1329070" cy="1490816"/>
-        </p:xfrm>
-        <a:graphic>
-          <a:graphicData uri="http://schemas.openxmlformats.org/drawingml/2006/table">
-            <a:tbl>
-              <a:tblPr firstRow="1" bandRow="1">
-                <a:tableStyleId>{5940675A-B579-460E-94D1-54222C63F5DA}</a:tableStyleId>
-              </a:tblPr>
-              <a:tblGrid>
-                <a:gridCol w="312725">
-                  <a:extLst>
-                    <a:ext uri="{9D8B030D-6E8A-4147-A177-3AD203B41FA5}">
-                      <a16:colId xmlns:a16="http://schemas.microsoft.com/office/drawing/2014/main" val="2256347462"/>
-                    </a:ext>
-                  </a:extLst>
-                </a:gridCol>
-                <a:gridCol w="1016345">
-                  <a:extLst>
-                    <a:ext uri="{9D8B030D-6E8A-4147-A177-3AD203B41FA5}">
-                      <a16:colId xmlns:a16="http://schemas.microsoft.com/office/drawing/2014/main" val="1000086060"/>
-                    </a:ext>
-                  </a:extLst>
-                </a:gridCol>
-              </a:tblGrid>
-              <a:tr h="372704">
-                <a:tc>
-                  <a:txBody>
-                    <a:bodyPr/>
-                    <a:lstStyle/>
-                    <a:p>
-                      <a:r>
-                        <a:rPr lang="en-US" sz="1800" kern="1200" dirty="0">
-                          <a:solidFill>
-                            <a:srgbClr val="B71E56"/>
-                          </a:solidFill>
-                          <a:latin typeface="+mj-lt"/>
-                          <a:ea typeface="+mn-ea"/>
-                          <a:cs typeface="+mn-cs"/>
-                        </a:rPr>
-                        <a:t>Q</a:t>
-                      </a:r>
-                      <a:endParaRPr lang="en-US" sz="1800" dirty="0">
-                        <a:latin typeface="+mj-lt"/>
-                      </a:endParaRPr>
-                    </a:p>
-                  </a:txBody>
-                  <a:tcPr/>
-                </a:tc>
-                <a:tc>
-                  <a:txBody>
-                    <a:bodyPr/>
-                    <a:lstStyle/>
-                    <a:p>
-                      <a:r>
-                        <a:rPr lang="en-US" sz="1800" kern="1200" dirty="0">
-                          <a:solidFill>
-                            <a:srgbClr val="B71E56"/>
-                          </a:solidFill>
-                          <a:latin typeface="+mj-lt"/>
-                          <a:ea typeface="+mn-ea"/>
-                          <a:cs typeface="+mn-cs"/>
-                        </a:rPr>
-                        <a:t>Query</a:t>
-                      </a:r>
-                      <a:endParaRPr lang="en-US" sz="1800" dirty="0">
-                        <a:latin typeface="+mj-lt"/>
-                      </a:endParaRPr>
-                    </a:p>
-                  </a:txBody>
-                  <a:tcPr/>
-                </a:tc>
-                <a:extLst>
-                  <a:ext uri="{0D108BD9-81ED-4DB2-BD59-A6C34878D82A}">
-                    <a16:rowId xmlns:a16="http://schemas.microsoft.com/office/drawing/2014/main" val="1110988348"/>
-                  </a:ext>
-                </a:extLst>
-              </a:tr>
-              <a:tr h="372704">
-                <a:tc>
-                  <a:txBody>
-                    <a:bodyPr/>
-                    <a:lstStyle/>
-                    <a:p>
-                      <a:r>
-                        <a:rPr lang="en-US" sz="1800" kern="1200" dirty="0">
-                          <a:solidFill>
-                            <a:srgbClr val="2D83B7"/>
-                          </a:solidFill>
-                          <a:latin typeface="+mj-lt"/>
-                          <a:ea typeface="+mn-ea"/>
-                          <a:cs typeface="+mn-cs"/>
-                        </a:rPr>
-                        <a:t>K</a:t>
-                      </a:r>
-                      <a:endParaRPr lang="en-US" sz="1800" dirty="0">
-                        <a:latin typeface="+mj-lt"/>
-                      </a:endParaRPr>
-                    </a:p>
-                  </a:txBody>
-                  <a:tcPr/>
-                </a:tc>
-                <a:tc>
-                  <a:txBody>
-                    <a:bodyPr/>
-                    <a:lstStyle/>
-                    <a:p>
-                      <a:r>
-                        <a:rPr lang="en-US" sz="1800" kern="1200" dirty="0">
-                          <a:solidFill>
-                            <a:srgbClr val="2D83B7"/>
-                          </a:solidFill>
-                          <a:latin typeface="+mj-lt"/>
-                          <a:ea typeface="+mn-ea"/>
-                          <a:cs typeface="+mn-cs"/>
-                        </a:rPr>
-                        <a:t>Key </a:t>
-                      </a:r>
-                      <a:endParaRPr lang="en-US" sz="1800" dirty="0">
-                        <a:latin typeface="+mj-lt"/>
-                      </a:endParaRPr>
-                    </a:p>
-                  </a:txBody>
-                  <a:tcPr/>
-                </a:tc>
-                <a:extLst>
-                  <a:ext uri="{0D108BD9-81ED-4DB2-BD59-A6C34878D82A}">
-                    <a16:rowId xmlns:a16="http://schemas.microsoft.com/office/drawing/2014/main" val="1982827846"/>
-                  </a:ext>
-                </a:extLst>
-              </a:tr>
-              <a:tr h="372704">
-                <a:tc>
-                  <a:txBody>
-                    <a:bodyPr/>
-                    <a:lstStyle/>
-                    <a:p>
-                      <a:r>
-                        <a:rPr lang="en-US" sz="1800" kern="1200" dirty="0">
-                          <a:solidFill>
-                            <a:srgbClr val="319F48"/>
-                          </a:solidFill>
-                          <a:latin typeface="+mj-lt"/>
-                          <a:ea typeface="+mn-ea"/>
-                          <a:cs typeface="+mn-cs"/>
-                        </a:rPr>
-                        <a:t>V </a:t>
-                      </a:r>
-                      <a:endParaRPr lang="en-US" sz="1800" dirty="0">
-                        <a:latin typeface="+mj-lt"/>
-                      </a:endParaRPr>
-                    </a:p>
-                  </a:txBody>
-                  <a:tcPr/>
-                </a:tc>
-                <a:tc>
-                  <a:txBody>
-                    <a:bodyPr/>
-                    <a:lstStyle/>
-                    <a:p>
-                      <a:r>
-                        <a:rPr lang="en-US" sz="1800" kern="1200" dirty="0">
-                          <a:solidFill>
-                            <a:srgbClr val="319F48"/>
-                          </a:solidFill>
-                          <a:latin typeface="+mj-lt"/>
-                          <a:ea typeface="+mn-ea"/>
-                          <a:cs typeface="+mn-cs"/>
-                        </a:rPr>
-                        <a:t>Value</a:t>
-                      </a:r>
-                      <a:endParaRPr lang="en-US" sz="1800" dirty="0">
-                        <a:latin typeface="+mj-lt"/>
-                      </a:endParaRPr>
-                    </a:p>
-                  </a:txBody>
-                  <a:tcPr/>
-                </a:tc>
-                <a:extLst>
-                  <a:ext uri="{0D108BD9-81ED-4DB2-BD59-A6C34878D82A}">
-                    <a16:rowId xmlns:a16="http://schemas.microsoft.com/office/drawing/2014/main" val="2431682978"/>
-                  </a:ext>
-                </a:extLst>
-              </a:tr>
-              <a:tr h="372704">
-                <a:tc>
-                  <a:txBody>
-                    <a:bodyPr/>
-                    <a:lstStyle/>
-                    <a:p>
-                      <a:r>
-                        <a:rPr lang="en-US" sz="1800" kern="1200" dirty="0">
-                          <a:solidFill>
-                            <a:srgbClr val="93742C"/>
-                          </a:solidFill>
-                          <a:latin typeface="+mj-lt"/>
-                          <a:ea typeface="+mn-ea"/>
-                          <a:cs typeface="+mn-cs"/>
-                        </a:rPr>
-                        <a:t>S</a:t>
-                      </a:r>
-                      <a:endParaRPr lang="en-US" sz="1800" dirty="0">
-                        <a:latin typeface="+mj-lt"/>
-                      </a:endParaRPr>
-                    </a:p>
-                  </a:txBody>
-                  <a:tcPr/>
-                </a:tc>
-                <a:tc>
-                  <a:txBody>
-                    <a:bodyPr/>
-                    <a:lstStyle/>
-                    <a:p>
-                      <a:r>
-                        <a:rPr lang="en-US" sz="1800" kern="1200" dirty="0">
-                          <a:solidFill>
-                            <a:srgbClr val="93742C"/>
-                          </a:solidFill>
-                          <a:latin typeface="+mj-lt"/>
-                          <a:ea typeface="+mn-ea"/>
-                          <a:cs typeface="+mn-cs"/>
-                        </a:rPr>
-                        <a:t>Score</a:t>
-                      </a:r>
-                      <a:endParaRPr lang="en-US" sz="1800" dirty="0">
-                        <a:latin typeface="+mj-lt"/>
-                      </a:endParaRPr>
-                    </a:p>
-                  </a:txBody>
-                  <a:tcPr/>
-                </a:tc>
-                <a:extLst>
-                  <a:ext uri="{0D108BD9-81ED-4DB2-BD59-A6C34878D82A}">
-                    <a16:rowId xmlns:a16="http://schemas.microsoft.com/office/drawing/2014/main" val="3072527918"/>
-                  </a:ext>
-                </a:extLst>
-              </a:tr>
-            </a:tbl>
-          </a:graphicData>
-        </a:graphic>
-      </p:graphicFrame>
-    </p:spTree>
-    <p:extLst>
-      <p:ext uri="{BB962C8B-B14F-4D97-AF65-F5344CB8AC3E}">
-        <p14:creationId xmlns:p14="http://schemas.microsoft.com/office/powerpoint/2010/main" val="4133325865"/>
-      </p:ext>
-    </p:extLst>
-  </p:cSld>
-  <p:clrMapOvr>
-    <a:masterClrMapping/>
-  </p:clrMapOvr>
-</p:sld>
-</file>
-
-<file path=ppt/slides/slide11.xml><?xml version="1.0" encoding="utf-8"?>
-<p:sld xmlns:a="http://schemas.openxmlformats.org/drawingml/2006/main" xmlns:r="http://schemas.openxmlformats.org/officeDocument/2006/relationships" xmlns:p="http://schemas.openxmlformats.org/presentationml/2006/main">
-  <p:cSld>
-    <p:spTree>
-      <p:nvGrpSpPr>
-        <p:cNvPr id="1" name=""/>
-        <p:cNvGrpSpPr/>
-        <p:nvPr/>
-      </p:nvGrpSpPr>
-      <p:grpSpPr>
-        <a:xfrm>
-          <a:off x="0" y="0"/>
-          <a:ext cx="0" cy="0"/>
-          <a:chOff x="0" y="0"/>
-          <a:chExt cx="0" cy="0"/>
-        </a:xfrm>
-      </p:grpSpPr>
-      <p:pic>
-        <p:nvPicPr>
           <p:cNvPr id="6" name="Picture 5">
             <a:extLst>
               <a:ext uri="{FF2B5EF4-FFF2-40B4-BE49-F238E27FC236}">
@@ -7881,7 +7487,7 @@
 </p:sld>
 </file>
 
-<file path=ppt/slides/slide12.xml><?xml version="1.0" encoding="utf-8"?>
+<file path=ppt/slides/slide11.xml><?xml version="1.0" encoding="utf-8"?>
 <p:sld xmlns:a="http://schemas.openxmlformats.org/drawingml/2006/main" xmlns:r="http://schemas.openxmlformats.org/officeDocument/2006/relationships" xmlns:p="http://schemas.openxmlformats.org/presentationml/2006/main">
   <p:cSld>
     <p:spTree>
@@ -8709,7 +8315,7 @@
 </p:sld>
 </file>
 
-<file path=ppt/slides/slide13.xml><?xml version="1.0" encoding="utf-8"?>
+<file path=ppt/slides/slide12.xml><?xml version="1.0" encoding="utf-8"?>
 <p:sld xmlns:a="http://schemas.openxmlformats.org/drawingml/2006/main" xmlns:r="http://schemas.openxmlformats.org/officeDocument/2006/relationships" xmlns:p="http://schemas.openxmlformats.org/presentationml/2006/main">
   <p:cSld>
     <p:spTree>
@@ -8787,7 +8393,7 @@
 </p:sld>
 </file>
 
-<file path=ppt/slides/slide14.xml><?xml version="1.0" encoding="utf-8"?>
+<file path=ppt/slides/slide13.xml><?xml version="1.0" encoding="utf-8"?>
 <p:sld xmlns:a="http://schemas.openxmlformats.org/drawingml/2006/main" xmlns:r="http://schemas.openxmlformats.org/officeDocument/2006/relationships" xmlns:p="http://schemas.openxmlformats.org/presentationml/2006/main">
   <p:cSld>
     <p:spTree>
@@ -8956,7 +8562,7 @@
 </p:sld>
 </file>
 
-<file path=ppt/slides/slide15.xml><?xml version="1.0" encoding="utf-8"?>
+<file path=ppt/slides/slide14.xml><?xml version="1.0" encoding="utf-8"?>
 <p:sld xmlns:a="http://schemas.openxmlformats.org/drawingml/2006/main" xmlns:r="http://schemas.openxmlformats.org/officeDocument/2006/relationships" xmlns:p="http://schemas.openxmlformats.org/presentationml/2006/main">
   <p:cSld>
     <p:spTree>
@@ -9164,7 +8770,7 @@
 </p:sld>
 </file>
 
-<file path=ppt/slides/slide16.xml><?xml version="1.0" encoding="utf-8"?>
+<file path=ppt/slides/slide15.xml><?xml version="1.0" encoding="utf-8"?>
 <p:sld xmlns:a="http://schemas.openxmlformats.org/drawingml/2006/main" xmlns:r="http://schemas.openxmlformats.org/officeDocument/2006/relationships" xmlns:p="http://schemas.openxmlformats.org/presentationml/2006/main">
   <p:cSld>
     <p:spTree>
@@ -9372,7 +8978,7 @@
 </p:sld>
 </file>
 
-<file path=ppt/slides/slide17.xml><?xml version="1.0" encoding="utf-8"?>
+<file path=ppt/slides/slide16.xml><?xml version="1.0" encoding="utf-8"?>
 <p:sld xmlns:a="http://schemas.openxmlformats.org/drawingml/2006/main" xmlns:r="http://schemas.openxmlformats.org/officeDocument/2006/relationships" xmlns:p="http://schemas.openxmlformats.org/presentationml/2006/main">
   <p:cSld>
     <p:spTree>
@@ -10231,7 +9837,7 @@
 </p:sld>
 </file>
 
-<file path=ppt/slides/slide18.xml><?xml version="1.0" encoding="utf-8"?>
+<file path=ppt/slides/slide17.xml><?xml version="1.0" encoding="utf-8"?>
 <p:sld xmlns:a="http://schemas.openxmlformats.org/drawingml/2006/main" xmlns:r="http://schemas.openxmlformats.org/officeDocument/2006/relationships" xmlns:p="http://schemas.openxmlformats.org/presentationml/2006/main">
   <p:cSld>
     <p:spTree>
@@ -10297,7 +9903,7 @@
 </p:sld>
 </file>
 
-<file path=ppt/slides/slide19.xml><?xml version="1.0" encoding="utf-8"?>
+<file path=ppt/slides/slide18.xml><?xml version="1.0" encoding="utf-8"?>
 <p:sld xmlns:a="http://schemas.openxmlformats.org/drawingml/2006/main" xmlns:r="http://schemas.openxmlformats.org/officeDocument/2006/relationships" xmlns:p="http://schemas.openxmlformats.org/presentationml/2006/main">
   <p:cSld>
     <p:spTree>
@@ -10363,795 +9969,7 @@
 </p:sld>
 </file>
 
-<file path=ppt/slides/slide2.xml><?xml version="1.0" encoding="utf-8"?>
-<p:sld xmlns:a="http://schemas.openxmlformats.org/drawingml/2006/main" xmlns:r="http://schemas.openxmlformats.org/officeDocument/2006/relationships" xmlns:p="http://schemas.openxmlformats.org/presentationml/2006/main">
-  <p:cSld>
-    <p:spTree>
-      <p:nvGrpSpPr>
-        <p:cNvPr id="1" name=""/>
-        <p:cNvGrpSpPr/>
-        <p:nvPr/>
-      </p:nvGrpSpPr>
-      <p:grpSpPr>
-        <a:xfrm>
-          <a:off x="0" y="0"/>
-          <a:ext cx="0" cy="0"/>
-          <a:chOff x="0" y="0"/>
-          <a:chExt cx="0" cy="0"/>
-        </a:xfrm>
-      </p:grpSpPr>
-      <p:sp>
-        <p:nvSpPr>
-          <p:cNvPr id="2" name="Title 1">
-            <a:extLst>
-              <a:ext uri="{FF2B5EF4-FFF2-40B4-BE49-F238E27FC236}">
-                <a16:creationId xmlns:a16="http://schemas.microsoft.com/office/drawing/2014/main" id="{0E138177-E2EE-ACAC-A57C-F03FA29EC836}"/>
-              </a:ext>
-            </a:extLst>
-          </p:cNvPr>
-          <p:cNvSpPr>
-            <a:spLocks noGrp="1"/>
-          </p:cNvSpPr>
-          <p:nvPr>
-            <p:ph type="title"/>
-          </p:nvPr>
-        </p:nvSpPr>
-        <p:spPr/>
-        <p:txBody>
-          <a:bodyPr/>
-          <a:lstStyle/>
-          <a:p>
-            <a:r>
-              <a:rPr lang="en-US" dirty="0">
-                <a:solidFill>
-                  <a:schemeClr val="tx1">
-                    <a:lumMod val="75000"/>
-                    <a:lumOff val="25000"/>
-                  </a:schemeClr>
-                </a:solidFill>
-                <a:latin typeface="Palatino Linotype" panose="02040502050505030304" pitchFamily="18" charset="0"/>
-              </a:rPr>
-              <a:t>Lesson Overview</a:t>
-            </a:r>
-          </a:p>
-        </p:txBody>
-      </p:sp>
-      <p:sp>
-        <p:nvSpPr>
-          <p:cNvPr id="3" name="Content Placeholder 2">
-            <a:extLst>
-              <a:ext uri="{FF2B5EF4-FFF2-40B4-BE49-F238E27FC236}">
-                <a16:creationId xmlns:a16="http://schemas.microsoft.com/office/drawing/2014/main" id="{8626DB86-54B4-A1E2-6C25-C049F364ED25}"/>
-              </a:ext>
-            </a:extLst>
-          </p:cNvPr>
-          <p:cNvSpPr>
-            <a:spLocks noGrp="1"/>
-          </p:cNvSpPr>
-          <p:nvPr>
-            <p:ph idx="1"/>
-          </p:nvPr>
-        </p:nvSpPr>
-        <p:spPr>
-          <a:xfrm>
-            <a:off x="1013564" y="1825626"/>
-            <a:ext cx="10515600" cy="504215"/>
-          </a:xfrm>
-        </p:spPr>
-        <p:txBody>
-          <a:bodyPr/>
-          <a:lstStyle/>
-          <a:p>
-            <a:pPr>
-              <a:buFont typeface="Wingdings" panose="05000000000000000000" pitchFamily="2" charset="2"/>
-              <a:buChar char="Ø"/>
-            </a:pPr>
-            <a:r>
-              <a:rPr lang="en-US" dirty="0">
-                <a:solidFill>
-                  <a:schemeClr val="tx1">
-                    <a:lumMod val="75000"/>
-                    <a:lumOff val="25000"/>
-                  </a:schemeClr>
-                </a:solidFill>
-              </a:rPr>
-              <a:t> </a:t>
-            </a:r>
-            <a:r>
-              <a:rPr lang="en-US" dirty="0">
-                <a:solidFill>
-                  <a:schemeClr val="tx1">
-                    <a:lumMod val="75000"/>
-                    <a:lumOff val="25000"/>
-                  </a:schemeClr>
-                </a:solidFill>
-                <a:latin typeface="Palatino Linotype" panose="02040502050505030304" pitchFamily="18" charset="0"/>
-              </a:rPr>
-              <a:t>Learning Objective 1</a:t>
-            </a:r>
-          </a:p>
-        </p:txBody>
-      </p:sp>
-      <p:sp>
-        <p:nvSpPr>
-          <p:cNvPr id="5" name="Content Placeholder 2">
-            <a:extLst>
-              <a:ext uri="{FF2B5EF4-FFF2-40B4-BE49-F238E27FC236}">
-                <a16:creationId xmlns:a16="http://schemas.microsoft.com/office/drawing/2014/main" id="{7070644F-62DF-8674-4A8A-C2FA1554028E}"/>
-              </a:ext>
-            </a:extLst>
-          </p:cNvPr>
-          <p:cNvSpPr txBox="1">
-            <a:spLocks/>
-          </p:cNvSpPr>
-          <p:nvPr/>
-        </p:nvSpPr>
-        <p:spPr>
-          <a:xfrm>
-            <a:off x="1013564" y="2464778"/>
-            <a:ext cx="10515600" cy="504215"/>
-          </a:xfrm>
-          <a:prstGeom prst="rect">
-            <a:avLst/>
-          </a:prstGeom>
-        </p:spPr>
-        <p:txBody>
-          <a:bodyPr vert="horz" lIns="91440" tIns="45720" rIns="91440" bIns="45720" rtlCol="0">
-            <a:normAutofit/>
-          </a:bodyPr>
-          <a:lstStyle>
-            <a:lvl1pPr marL="228600" indent="-228600" algn="l" defTabSz="914400" rtl="0" eaLnBrk="1" latinLnBrk="0" hangingPunct="1">
-              <a:lnSpc>
-                <a:spcPct val="90000"/>
-              </a:lnSpc>
-              <a:spcBef>
-                <a:spcPts val="1000"/>
-              </a:spcBef>
-              <a:buFont typeface="Arial" panose="020B0604020202020204" pitchFamily="34" charset="0"/>
-              <a:buChar char="•"/>
-              <a:defRPr sz="2800" kern="1200">
-                <a:solidFill>
-                  <a:schemeClr val="tx1"/>
-                </a:solidFill>
-                <a:latin typeface="+mn-lt"/>
-                <a:ea typeface="+mn-ea"/>
-                <a:cs typeface="+mn-cs"/>
-              </a:defRPr>
-            </a:lvl1pPr>
-            <a:lvl2pPr marL="685800" indent="-228600" algn="l" defTabSz="914400" rtl="0" eaLnBrk="1" latinLnBrk="0" hangingPunct="1">
-              <a:lnSpc>
-                <a:spcPct val="90000"/>
-              </a:lnSpc>
-              <a:spcBef>
-                <a:spcPts val="500"/>
-              </a:spcBef>
-              <a:buFont typeface="Arial" panose="020B0604020202020204" pitchFamily="34" charset="0"/>
-              <a:buChar char="•"/>
-              <a:defRPr sz="2400" kern="1200">
-                <a:solidFill>
-                  <a:schemeClr val="tx1"/>
-                </a:solidFill>
-                <a:latin typeface="+mn-lt"/>
-                <a:ea typeface="+mn-ea"/>
-                <a:cs typeface="+mn-cs"/>
-              </a:defRPr>
-            </a:lvl2pPr>
-            <a:lvl3pPr marL="1143000" indent="-228600" algn="l" defTabSz="914400" rtl="0" eaLnBrk="1" latinLnBrk="0" hangingPunct="1">
-              <a:lnSpc>
-                <a:spcPct val="90000"/>
-              </a:lnSpc>
-              <a:spcBef>
-                <a:spcPts val="500"/>
-              </a:spcBef>
-              <a:buFont typeface="Arial" panose="020B0604020202020204" pitchFamily="34" charset="0"/>
-              <a:buChar char="•"/>
-              <a:defRPr sz="2000" kern="1200">
-                <a:solidFill>
-                  <a:schemeClr val="tx1"/>
-                </a:solidFill>
-                <a:latin typeface="+mn-lt"/>
-                <a:ea typeface="+mn-ea"/>
-                <a:cs typeface="+mn-cs"/>
-              </a:defRPr>
-            </a:lvl3pPr>
-            <a:lvl4pPr marL="1600200" indent="-228600" algn="l" defTabSz="914400" rtl="0" eaLnBrk="1" latinLnBrk="0" hangingPunct="1">
-              <a:lnSpc>
-                <a:spcPct val="90000"/>
-              </a:lnSpc>
-              <a:spcBef>
-                <a:spcPts val="500"/>
-              </a:spcBef>
-              <a:buFont typeface="Arial" panose="020B0604020202020204" pitchFamily="34" charset="0"/>
-              <a:buChar char="•"/>
-              <a:defRPr sz="1800" kern="1200">
-                <a:solidFill>
-                  <a:schemeClr val="tx1"/>
-                </a:solidFill>
-                <a:latin typeface="+mn-lt"/>
-                <a:ea typeface="+mn-ea"/>
-                <a:cs typeface="+mn-cs"/>
-              </a:defRPr>
-            </a:lvl4pPr>
-            <a:lvl5pPr marL="2057400" indent="-228600" algn="l" defTabSz="914400" rtl="0" eaLnBrk="1" latinLnBrk="0" hangingPunct="1">
-              <a:lnSpc>
-                <a:spcPct val="90000"/>
-              </a:lnSpc>
-              <a:spcBef>
-                <a:spcPts val="500"/>
-              </a:spcBef>
-              <a:buFont typeface="Arial" panose="020B0604020202020204" pitchFamily="34" charset="0"/>
-              <a:buChar char="•"/>
-              <a:defRPr sz="1800" kern="1200">
-                <a:solidFill>
-                  <a:schemeClr val="tx1"/>
-                </a:solidFill>
-                <a:latin typeface="+mn-lt"/>
-                <a:ea typeface="+mn-ea"/>
-                <a:cs typeface="+mn-cs"/>
-              </a:defRPr>
-            </a:lvl5pPr>
-            <a:lvl6pPr marL="2514600" indent="-228600" algn="l" defTabSz="914400" rtl="0" eaLnBrk="1" latinLnBrk="0" hangingPunct="1">
-              <a:lnSpc>
-                <a:spcPct val="90000"/>
-              </a:lnSpc>
-              <a:spcBef>
-                <a:spcPts val="500"/>
-              </a:spcBef>
-              <a:buFont typeface="Arial" panose="020B0604020202020204" pitchFamily="34" charset="0"/>
-              <a:buChar char="•"/>
-              <a:defRPr sz="1800" kern="1200">
-                <a:solidFill>
-                  <a:schemeClr val="tx1"/>
-                </a:solidFill>
-                <a:latin typeface="+mn-lt"/>
-                <a:ea typeface="+mn-ea"/>
-                <a:cs typeface="+mn-cs"/>
-              </a:defRPr>
-            </a:lvl6pPr>
-            <a:lvl7pPr marL="2971800" indent="-228600" algn="l" defTabSz="914400" rtl="0" eaLnBrk="1" latinLnBrk="0" hangingPunct="1">
-              <a:lnSpc>
-                <a:spcPct val="90000"/>
-              </a:lnSpc>
-              <a:spcBef>
-                <a:spcPts val="500"/>
-              </a:spcBef>
-              <a:buFont typeface="Arial" panose="020B0604020202020204" pitchFamily="34" charset="0"/>
-              <a:buChar char="•"/>
-              <a:defRPr sz="1800" kern="1200">
-                <a:solidFill>
-                  <a:schemeClr val="tx1"/>
-                </a:solidFill>
-                <a:latin typeface="+mn-lt"/>
-                <a:ea typeface="+mn-ea"/>
-                <a:cs typeface="+mn-cs"/>
-              </a:defRPr>
-            </a:lvl7pPr>
-            <a:lvl8pPr marL="3429000" indent="-228600" algn="l" defTabSz="914400" rtl="0" eaLnBrk="1" latinLnBrk="0" hangingPunct="1">
-              <a:lnSpc>
-                <a:spcPct val="90000"/>
-              </a:lnSpc>
-              <a:spcBef>
-                <a:spcPts val="500"/>
-              </a:spcBef>
-              <a:buFont typeface="Arial" panose="020B0604020202020204" pitchFamily="34" charset="0"/>
-              <a:buChar char="•"/>
-              <a:defRPr sz="1800" kern="1200">
-                <a:solidFill>
-                  <a:schemeClr val="tx1"/>
-                </a:solidFill>
-                <a:latin typeface="+mn-lt"/>
-                <a:ea typeface="+mn-ea"/>
-                <a:cs typeface="+mn-cs"/>
-              </a:defRPr>
-            </a:lvl8pPr>
-            <a:lvl9pPr marL="3886200" indent="-228600" algn="l" defTabSz="914400" rtl="0" eaLnBrk="1" latinLnBrk="0" hangingPunct="1">
-              <a:lnSpc>
-                <a:spcPct val="90000"/>
-              </a:lnSpc>
-              <a:spcBef>
-                <a:spcPts val="500"/>
-              </a:spcBef>
-              <a:buFont typeface="Arial" panose="020B0604020202020204" pitchFamily="34" charset="0"/>
-              <a:buChar char="•"/>
-              <a:defRPr sz="1800" kern="1200">
-                <a:solidFill>
-                  <a:schemeClr val="tx1"/>
-                </a:solidFill>
-                <a:latin typeface="+mn-lt"/>
-                <a:ea typeface="+mn-ea"/>
-                <a:cs typeface="+mn-cs"/>
-              </a:defRPr>
-            </a:lvl9pPr>
-          </a:lstStyle>
-          <a:p>
-            <a:pPr>
-              <a:buFont typeface="Wingdings" panose="05000000000000000000" pitchFamily="2" charset="2"/>
-              <a:buChar char="Ø"/>
-            </a:pPr>
-            <a:r>
-              <a:rPr lang="en-US" dirty="0">
-                <a:solidFill>
-                  <a:schemeClr val="tx1">
-                    <a:lumMod val="75000"/>
-                    <a:lumOff val="25000"/>
-                  </a:schemeClr>
-                </a:solidFill>
-              </a:rPr>
-              <a:t> </a:t>
-            </a:r>
-            <a:r>
-              <a:rPr lang="en-US" dirty="0">
-                <a:solidFill>
-                  <a:schemeClr val="tx1">
-                    <a:lumMod val="75000"/>
-                    <a:lumOff val="25000"/>
-                  </a:schemeClr>
-                </a:solidFill>
-                <a:latin typeface="Palatino Linotype" panose="02040502050505030304" pitchFamily="18" charset="0"/>
-              </a:rPr>
-              <a:t>Learning Objective 1</a:t>
-            </a:r>
-          </a:p>
-        </p:txBody>
-      </p:sp>
-      <p:sp>
-        <p:nvSpPr>
-          <p:cNvPr id="6" name="Content Placeholder 2">
-            <a:extLst>
-              <a:ext uri="{FF2B5EF4-FFF2-40B4-BE49-F238E27FC236}">
-                <a16:creationId xmlns:a16="http://schemas.microsoft.com/office/drawing/2014/main" id="{FF2490E1-D7A0-7027-6DCC-60BB6819CD9E}"/>
-              </a:ext>
-            </a:extLst>
-          </p:cNvPr>
-          <p:cNvSpPr txBox="1">
-            <a:spLocks/>
-          </p:cNvSpPr>
-          <p:nvPr/>
-        </p:nvSpPr>
-        <p:spPr>
-          <a:xfrm>
-            <a:off x="1013564" y="3103930"/>
-            <a:ext cx="10515600" cy="504215"/>
-          </a:xfrm>
-          <a:prstGeom prst="rect">
-            <a:avLst/>
-          </a:prstGeom>
-        </p:spPr>
-        <p:txBody>
-          <a:bodyPr vert="horz" lIns="91440" tIns="45720" rIns="91440" bIns="45720" rtlCol="0">
-            <a:normAutofit/>
-          </a:bodyPr>
-          <a:lstStyle>
-            <a:lvl1pPr marL="228600" indent="-228600" algn="l" defTabSz="914400" rtl="0" eaLnBrk="1" latinLnBrk="0" hangingPunct="1">
-              <a:lnSpc>
-                <a:spcPct val="90000"/>
-              </a:lnSpc>
-              <a:spcBef>
-                <a:spcPts val="1000"/>
-              </a:spcBef>
-              <a:buFont typeface="Arial" panose="020B0604020202020204" pitchFamily="34" charset="0"/>
-              <a:buChar char="•"/>
-              <a:defRPr sz="2800" kern="1200">
-                <a:solidFill>
-                  <a:schemeClr val="tx1"/>
-                </a:solidFill>
-                <a:latin typeface="+mn-lt"/>
-                <a:ea typeface="+mn-ea"/>
-                <a:cs typeface="+mn-cs"/>
-              </a:defRPr>
-            </a:lvl1pPr>
-            <a:lvl2pPr marL="685800" indent="-228600" algn="l" defTabSz="914400" rtl="0" eaLnBrk="1" latinLnBrk="0" hangingPunct="1">
-              <a:lnSpc>
-                <a:spcPct val="90000"/>
-              </a:lnSpc>
-              <a:spcBef>
-                <a:spcPts val="500"/>
-              </a:spcBef>
-              <a:buFont typeface="Arial" panose="020B0604020202020204" pitchFamily="34" charset="0"/>
-              <a:buChar char="•"/>
-              <a:defRPr sz="2400" kern="1200">
-                <a:solidFill>
-                  <a:schemeClr val="tx1"/>
-                </a:solidFill>
-                <a:latin typeface="+mn-lt"/>
-                <a:ea typeface="+mn-ea"/>
-                <a:cs typeface="+mn-cs"/>
-              </a:defRPr>
-            </a:lvl2pPr>
-            <a:lvl3pPr marL="1143000" indent="-228600" algn="l" defTabSz="914400" rtl="0" eaLnBrk="1" latinLnBrk="0" hangingPunct="1">
-              <a:lnSpc>
-                <a:spcPct val="90000"/>
-              </a:lnSpc>
-              <a:spcBef>
-                <a:spcPts val="500"/>
-              </a:spcBef>
-              <a:buFont typeface="Arial" panose="020B0604020202020204" pitchFamily="34" charset="0"/>
-              <a:buChar char="•"/>
-              <a:defRPr sz="2000" kern="1200">
-                <a:solidFill>
-                  <a:schemeClr val="tx1"/>
-                </a:solidFill>
-                <a:latin typeface="+mn-lt"/>
-                <a:ea typeface="+mn-ea"/>
-                <a:cs typeface="+mn-cs"/>
-              </a:defRPr>
-            </a:lvl3pPr>
-            <a:lvl4pPr marL="1600200" indent="-228600" algn="l" defTabSz="914400" rtl="0" eaLnBrk="1" latinLnBrk="0" hangingPunct="1">
-              <a:lnSpc>
-                <a:spcPct val="90000"/>
-              </a:lnSpc>
-              <a:spcBef>
-                <a:spcPts val="500"/>
-              </a:spcBef>
-              <a:buFont typeface="Arial" panose="020B0604020202020204" pitchFamily="34" charset="0"/>
-              <a:buChar char="•"/>
-              <a:defRPr sz="1800" kern="1200">
-                <a:solidFill>
-                  <a:schemeClr val="tx1"/>
-                </a:solidFill>
-                <a:latin typeface="+mn-lt"/>
-                <a:ea typeface="+mn-ea"/>
-                <a:cs typeface="+mn-cs"/>
-              </a:defRPr>
-            </a:lvl4pPr>
-            <a:lvl5pPr marL="2057400" indent="-228600" algn="l" defTabSz="914400" rtl="0" eaLnBrk="1" latinLnBrk="0" hangingPunct="1">
-              <a:lnSpc>
-                <a:spcPct val="90000"/>
-              </a:lnSpc>
-              <a:spcBef>
-                <a:spcPts val="500"/>
-              </a:spcBef>
-              <a:buFont typeface="Arial" panose="020B0604020202020204" pitchFamily="34" charset="0"/>
-              <a:buChar char="•"/>
-              <a:defRPr sz="1800" kern="1200">
-                <a:solidFill>
-                  <a:schemeClr val="tx1"/>
-                </a:solidFill>
-                <a:latin typeface="+mn-lt"/>
-                <a:ea typeface="+mn-ea"/>
-                <a:cs typeface="+mn-cs"/>
-              </a:defRPr>
-            </a:lvl5pPr>
-            <a:lvl6pPr marL="2514600" indent="-228600" algn="l" defTabSz="914400" rtl="0" eaLnBrk="1" latinLnBrk="0" hangingPunct="1">
-              <a:lnSpc>
-                <a:spcPct val="90000"/>
-              </a:lnSpc>
-              <a:spcBef>
-                <a:spcPts val="500"/>
-              </a:spcBef>
-              <a:buFont typeface="Arial" panose="020B0604020202020204" pitchFamily="34" charset="0"/>
-              <a:buChar char="•"/>
-              <a:defRPr sz="1800" kern="1200">
-                <a:solidFill>
-                  <a:schemeClr val="tx1"/>
-                </a:solidFill>
-                <a:latin typeface="+mn-lt"/>
-                <a:ea typeface="+mn-ea"/>
-                <a:cs typeface="+mn-cs"/>
-              </a:defRPr>
-            </a:lvl6pPr>
-            <a:lvl7pPr marL="2971800" indent="-228600" algn="l" defTabSz="914400" rtl="0" eaLnBrk="1" latinLnBrk="0" hangingPunct="1">
-              <a:lnSpc>
-                <a:spcPct val="90000"/>
-              </a:lnSpc>
-              <a:spcBef>
-                <a:spcPts val="500"/>
-              </a:spcBef>
-              <a:buFont typeface="Arial" panose="020B0604020202020204" pitchFamily="34" charset="0"/>
-              <a:buChar char="•"/>
-              <a:defRPr sz="1800" kern="1200">
-                <a:solidFill>
-                  <a:schemeClr val="tx1"/>
-                </a:solidFill>
-                <a:latin typeface="+mn-lt"/>
-                <a:ea typeface="+mn-ea"/>
-                <a:cs typeface="+mn-cs"/>
-              </a:defRPr>
-            </a:lvl7pPr>
-            <a:lvl8pPr marL="3429000" indent="-228600" algn="l" defTabSz="914400" rtl="0" eaLnBrk="1" latinLnBrk="0" hangingPunct="1">
-              <a:lnSpc>
-                <a:spcPct val="90000"/>
-              </a:lnSpc>
-              <a:spcBef>
-                <a:spcPts val="500"/>
-              </a:spcBef>
-              <a:buFont typeface="Arial" panose="020B0604020202020204" pitchFamily="34" charset="0"/>
-              <a:buChar char="•"/>
-              <a:defRPr sz="1800" kern="1200">
-                <a:solidFill>
-                  <a:schemeClr val="tx1"/>
-                </a:solidFill>
-                <a:latin typeface="+mn-lt"/>
-                <a:ea typeface="+mn-ea"/>
-                <a:cs typeface="+mn-cs"/>
-              </a:defRPr>
-            </a:lvl8pPr>
-            <a:lvl9pPr marL="3886200" indent="-228600" algn="l" defTabSz="914400" rtl="0" eaLnBrk="1" latinLnBrk="0" hangingPunct="1">
-              <a:lnSpc>
-                <a:spcPct val="90000"/>
-              </a:lnSpc>
-              <a:spcBef>
-                <a:spcPts val="500"/>
-              </a:spcBef>
-              <a:buFont typeface="Arial" panose="020B0604020202020204" pitchFamily="34" charset="0"/>
-              <a:buChar char="•"/>
-              <a:defRPr sz="1800" kern="1200">
-                <a:solidFill>
-                  <a:schemeClr val="tx1"/>
-                </a:solidFill>
-                <a:latin typeface="+mn-lt"/>
-                <a:ea typeface="+mn-ea"/>
-                <a:cs typeface="+mn-cs"/>
-              </a:defRPr>
-            </a:lvl9pPr>
-          </a:lstStyle>
-          <a:p>
-            <a:pPr>
-              <a:buFont typeface="Wingdings" panose="05000000000000000000" pitchFamily="2" charset="2"/>
-              <a:buChar char="Ø"/>
-            </a:pPr>
-            <a:r>
-              <a:rPr lang="en-US" dirty="0">
-                <a:solidFill>
-                  <a:schemeClr val="tx1">
-                    <a:lumMod val="75000"/>
-                    <a:lumOff val="25000"/>
-                  </a:schemeClr>
-                </a:solidFill>
-              </a:rPr>
-              <a:t> </a:t>
-            </a:r>
-            <a:r>
-              <a:rPr lang="en-US" dirty="0">
-                <a:solidFill>
-                  <a:schemeClr val="tx1">
-                    <a:lumMod val="75000"/>
-                    <a:lumOff val="25000"/>
-                  </a:schemeClr>
-                </a:solidFill>
-                <a:latin typeface="Palatino Linotype" panose="02040502050505030304" pitchFamily="18" charset="0"/>
-              </a:rPr>
-              <a:t>Learning Objective 1</a:t>
-            </a:r>
-          </a:p>
-        </p:txBody>
-      </p:sp>
-      <p:sp>
-        <p:nvSpPr>
-          <p:cNvPr id="7" name="Content Placeholder 2">
-            <a:extLst>
-              <a:ext uri="{FF2B5EF4-FFF2-40B4-BE49-F238E27FC236}">
-                <a16:creationId xmlns:a16="http://schemas.microsoft.com/office/drawing/2014/main" id="{6D3279E5-D518-B484-9FCF-B12663A4E8FF}"/>
-              </a:ext>
-            </a:extLst>
-          </p:cNvPr>
-          <p:cNvSpPr txBox="1">
-            <a:spLocks/>
-          </p:cNvSpPr>
-          <p:nvPr/>
-        </p:nvSpPr>
-        <p:spPr>
-          <a:xfrm>
-            <a:off x="1013564" y="3743082"/>
-            <a:ext cx="10515600" cy="504215"/>
-          </a:xfrm>
-          <a:prstGeom prst="rect">
-            <a:avLst/>
-          </a:prstGeom>
-        </p:spPr>
-        <p:txBody>
-          <a:bodyPr vert="horz" lIns="91440" tIns="45720" rIns="91440" bIns="45720" rtlCol="0">
-            <a:normAutofit/>
-          </a:bodyPr>
-          <a:lstStyle>
-            <a:lvl1pPr marL="228600" indent="-228600" algn="l" defTabSz="914400" rtl="0" eaLnBrk="1" latinLnBrk="0" hangingPunct="1">
-              <a:lnSpc>
-                <a:spcPct val="90000"/>
-              </a:lnSpc>
-              <a:spcBef>
-                <a:spcPts val="1000"/>
-              </a:spcBef>
-              <a:buFont typeface="Arial" panose="020B0604020202020204" pitchFamily="34" charset="0"/>
-              <a:buChar char="•"/>
-              <a:defRPr sz="2800" kern="1200">
-                <a:solidFill>
-                  <a:schemeClr val="tx1"/>
-                </a:solidFill>
-                <a:latin typeface="+mn-lt"/>
-                <a:ea typeface="+mn-ea"/>
-                <a:cs typeface="+mn-cs"/>
-              </a:defRPr>
-            </a:lvl1pPr>
-            <a:lvl2pPr marL="685800" indent="-228600" algn="l" defTabSz="914400" rtl="0" eaLnBrk="1" latinLnBrk="0" hangingPunct="1">
-              <a:lnSpc>
-                <a:spcPct val="90000"/>
-              </a:lnSpc>
-              <a:spcBef>
-                <a:spcPts val="500"/>
-              </a:spcBef>
-              <a:buFont typeface="Arial" panose="020B0604020202020204" pitchFamily="34" charset="0"/>
-              <a:buChar char="•"/>
-              <a:defRPr sz="2400" kern="1200">
-                <a:solidFill>
-                  <a:schemeClr val="tx1"/>
-                </a:solidFill>
-                <a:latin typeface="+mn-lt"/>
-                <a:ea typeface="+mn-ea"/>
-                <a:cs typeface="+mn-cs"/>
-              </a:defRPr>
-            </a:lvl2pPr>
-            <a:lvl3pPr marL="1143000" indent="-228600" algn="l" defTabSz="914400" rtl="0" eaLnBrk="1" latinLnBrk="0" hangingPunct="1">
-              <a:lnSpc>
-                <a:spcPct val="90000"/>
-              </a:lnSpc>
-              <a:spcBef>
-                <a:spcPts val="500"/>
-              </a:spcBef>
-              <a:buFont typeface="Arial" panose="020B0604020202020204" pitchFamily="34" charset="0"/>
-              <a:buChar char="•"/>
-              <a:defRPr sz="2000" kern="1200">
-                <a:solidFill>
-                  <a:schemeClr val="tx1"/>
-                </a:solidFill>
-                <a:latin typeface="+mn-lt"/>
-                <a:ea typeface="+mn-ea"/>
-                <a:cs typeface="+mn-cs"/>
-              </a:defRPr>
-            </a:lvl3pPr>
-            <a:lvl4pPr marL="1600200" indent="-228600" algn="l" defTabSz="914400" rtl="0" eaLnBrk="1" latinLnBrk="0" hangingPunct="1">
-              <a:lnSpc>
-                <a:spcPct val="90000"/>
-              </a:lnSpc>
-              <a:spcBef>
-                <a:spcPts val="500"/>
-              </a:spcBef>
-              <a:buFont typeface="Arial" panose="020B0604020202020204" pitchFamily="34" charset="0"/>
-              <a:buChar char="•"/>
-              <a:defRPr sz="1800" kern="1200">
-                <a:solidFill>
-                  <a:schemeClr val="tx1"/>
-                </a:solidFill>
-                <a:latin typeface="+mn-lt"/>
-                <a:ea typeface="+mn-ea"/>
-                <a:cs typeface="+mn-cs"/>
-              </a:defRPr>
-            </a:lvl4pPr>
-            <a:lvl5pPr marL="2057400" indent="-228600" algn="l" defTabSz="914400" rtl="0" eaLnBrk="1" latinLnBrk="0" hangingPunct="1">
-              <a:lnSpc>
-                <a:spcPct val="90000"/>
-              </a:lnSpc>
-              <a:spcBef>
-                <a:spcPts val="500"/>
-              </a:spcBef>
-              <a:buFont typeface="Arial" panose="020B0604020202020204" pitchFamily="34" charset="0"/>
-              <a:buChar char="•"/>
-              <a:defRPr sz="1800" kern="1200">
-                <a:solidFill>
-                  <a:schemeClr val="tx1"/>
-                </a:solidFill>
-                <a:latin typeface="+mn-lt"/>
-                <a:ea typeface="+mn-ea"/>
-                <a:cs typeface="+mn-cs"/>
-              </a:defRPr>
-            </a:lvl5pPr>
-            <a:lvl6pPr marL="2514600" indent="-228600" algn="l" defTabSz="914400" rtl="0" eaLnBrk="1" latinLnBrk="0" hangingPunct="1">
-              <a:lnSpc>
-                <a:spcPct val="90000"/>
-              </a:lnSpc>
-              <a:spcBef>
-                <a:spcPts val="500"/>
-              </a:spcBef>
-              <a:buFont typeface="Arial" panose="020B0604020202020204" pitchFamily="34" charset="0"/>
-              <a:buChar char="•"/>
-              <a:defRPr sz="1800" kern="1200">
-                <a:solidFill>
-                  <a:schemeClr val="tx1"/>
-                </a:solidFill>
-                <a:latin typeface="+mn-lt"/>
-                <a:ea typeface="+mn-ea"/>
-                <a:cs typeface="+mn-cs"/>
-              </a:defRPr>
-            </a:lvl6pPr>
-            <a:lvl7pPr marL="2971800" indent="-228600" algn="l" defTabSz="914400" rtl="0" eaLnBrk="1" latinLnBrk="0" hangingPunct="1">
-              <a:lnSpc>
-                <a:spcPct val="90000"/>
-              </a:lnSpc>
-              <a:spcBef>
-                <a:spcPts val="500"/>
-              </a:spcBef>
-              <a:buFont typeface="Arial" panose="020B0604020202020204" pitchFamily="34" charset="0"/>
-              <a:buChar char="•"/>
-              <a:defRPr sz="1800" kern="1200">
-                <a:solidFill>
-                  <a:schemeClr val="tx1"/>
-                </a:solidFill>
-                <a:latin typeface="+mn-lt"/>
-                <a:ea typeface="+mn-ea"/>
-                <a:cs typeface="+mn-cs"/>
-              </a:defRPr>
-            </a:lvl7pPr>
-            <a:lvl8pPr marL="3429000" indent="-228600" algn="l" defTabSz="914400" rtl="0" eaLnBrk="1" latinLnBrk="0" hangingPunct="1">
-              <a:lnSpc>
-                <a:spcPct val="90000"/>
-              </a:lnSpc>
-              <a:spcBef>
-                <a:spcPts val="500"/>
-              </a:spcBef>
-              <a:buFont typeface="Arial" panose="020B0604020202020204" pitchFamily="34" charset="0"/>
-              <a:buChar char="•"/>
-              <a:defRPr sz="1800" kern="1200">
-                <a:solidFill>
-                  <a:schemeClr val="tx1"/>
-                </a:solidFill>
-                <a:latin typeface="+mn-lt"/>
-                <a:ea typeface="+mn-ea"/>
-                <a:cs typeface="+mn-cs"/>
-              </a:defRPr>
-            </a:lvl8pPr>
-            <a:lvl9pPr marL="3886200" indent="-228600" algn="l" defTabSz="914400" rtl="0" eaLnBrk="1" latinLnBrk="0" hangingPunct="1">
-              <a:lnSpc>
-                <a:spcPct val="90000"/>
-              </a:lnSpc>
-              <a:spcBef>
-                <a:spcPts val="500"/>
-              </a:spcBef>
-              <a:buFont typeface="Arial" panose="020B0604020202020204" pitchFamily="34" charset="0"/>
-              <a:buChar char="•"/>
-              <a:defRPr sz="1800" kern="1200">
-                <a:solidFill>
-                  <a:schemeClr val="tx1"/>
-                </a:solidFill>
-                <a:latin typeface="+mn-lt"/>
-                <a:ea typeface="+mn-ea"/>
-                <a:cs typeface="+mn-cs"/>
-              </a:defRPr>
-            </a:lvl9pPr>
-          </a:lstStyle>
-          <a:p>
-            <a:pPr>
-              <a:buFont typeface="Wingdings" panose="05000000000000000000" pitchFamily="2" charset="2"/>
-              <a:buChar char="Ø"/>
-            </a:pPr>
-            <a:r>
-              <a:rPr lang="en-US" dirty="0">
-                <a:solidFill>
-                  <a:schemeClr val="tx1">
-                    <a:lumMod val="75000"/>
-                    <a:lumOff val="25000"/>
-                  </a:schemeClr>
-                </a:solidFill>
-              </a:rPr>
-              <a:t> </a:t>
-            </a:r>
-            <a:r>
-              <a:rPr lang="en-US" dirty="0">
-                <a:solidFill>
-                  <a:schemeClr val="tx1">
-                    <a:lumMod val="75000"/>
-                    <a:lumOff val="25000"/>
-                  </a:schemeClr>
-                </a:solidFill>
-                <a:latin typeface="Palatino Linotype" panose="02040502050505030304" pitchFamily="18" charset="0"/>
-              </a:rPr>
-              <a:t>Learning Objective 1</a:t>
-            </a:r>
-          </a:p>
-        </p:txBody>
-      </p:sp>
-    </p:spTree>
-    <p:extLst>
-      <p:ext uri="{BB962C8B-B14F-4D97-AF65-F5344CB8AC3E}">
-        <p14:creationId xmlns:p14="http://schemas.microsoft.com/office/powerpoint/2010/main" val="1416141381"/>
-      </p:ext>
-    </p:extLst>
-  </p:cSld>
-  <p:clrMapOvr>
-    <a:masterClrMapping/>
-  </p:clrMapOvr>
-</p:sld>
-</file>
-
-<file path=ppt/slides/slide20.xml><?xml version="1.0" encoding="utf-8"?>
+<file path=ppt/slides/slide19.xml><?xml version="1.0" encoding="utf-8"?>
 <p:sld xmlns:a="http://schemas.openxmlformats.org/drawingml/2006/main" xmlns:r="http://schemas.openxmlformats.org/officeDocument/2006/relationships" xmlns:p="http://schemas.openxmlformats.org/presentationml/2006/main">
   <p:cSld>
     <p:spTree>
@@ -11320,7 +10138,410 @@
 </p:sld>
 </file>
 
-<file path=ppt/slides/slide21.xml><?xml version="1.0" encoding="utf-8"?>
+<file path=ppt/slides/slide2.xml><?xml version="1.0" encoding="utf-8"?>
+<p:sld xmlns:a="http://schemas.openxmlformats.org/drawingml/2006/main" xmlns:r="http://schemas.openxmlformats.org/officeDocument/2006/relationships" xmlns:p="http://schemas.openxmlformats.org/presentationml/2006/main">
+  <p:cSld>
+    <p:spTree>
+      <p:nvGrpSpPr>
+        <p:cNvPr id="1" name=""/>
+        <p:cNvGrpSpPr/>
+        <p:nvPr/>
+      </p:nvGrpSpPr>
+      <p:grpSpPr>
+        <a:xfrm>
+          <a:off x="0" y="0"/>
+          <a:ext cx="0" cy="0"/>
+          <a:chOff x="0" y="0"/>
+          <a:chExt cx="0" cy="0"/>
+        </a:xfrm>
+      </p:grpSpPr>
+      <p:sp>
+        <p:nvSpPr>
+          <p:cNvPr id="3" name="TextBox 2">
+            <a:extLst>
+              <a:ext uri="{FF2B5EF4-FFF2-40B4-BE49-F238E27FC236}">
+                <a16:creationId xmlns:a16="http://schemas.microsoft.com/office/drawing/2014/main" id="{C1E53685-A9F7-4FE0-ABDB-9B755F275882}"/>
+              </a:ext>
+            </a:extLst>
+          </p:cNvPr>
+          <p:cNvSpPr txBox="1"/>
+          <p:nvPr/>
+        </p:nvSpPr>
+        <p:spPr>
+          <a:xfrm>
+            <a:off x="0" y="6550223"/>
+            <a:ext cx="12192000" cy="307777"/>
+          </a:xfrm>
+          <a:prstGeom prst="rect">
+            <a:avLst/>
+          </a:prstGeom>
+          <a:noFill/>
+        </p:spPr>
+        <p:txBody>
+          <a:bodyPr wrap="square" rtlCol="0">
+            <a:spAutoFit/>
+          </a:bodyPr>
+          <a:lstStyle/>
+          <a:p>
+            <a:r>
+              <a:rPr lang="en-US" sz="1400" dirty="0">
+                <a:solidFill>
+                  <a:schemeClr val="tx1">
+                    <a:lumMod val="65000"/>
+                    <a:lumOff val="35000"/>
+                  </a:schemeClr>
+                </a:solidFill>
+                <a:latin typeface="+mj-lt"/>
+                <a:ea typeface="Verdana" panose="020B0604030504040204" pitchFamily="34" charset="0"/>
+              </a:rPr>
+              <a:t>Source: Glassner, A. (2021). </a:t>
+            </a:r>
+            <a:r>
+              <a:rPr lang="en-US" sz="1400" i="1" dirty="0">
+                <a:solidFill>
+                  <a:schemeClr val="tx1">
+                    <a:lumMod val="65000"/>
+                    <a:lumOff val="35000"/>
+                  </a:schemeClr>
+                </a:solidFill>
+                <a:latin typeface="+mj-lt"/>
+                <a:ea typeface="Verdana" panose="020B0604030504040204" pitchFamily="34" charset="0"/>
+              </a:rPr>
+              <a:t>Deep learning: A visual approach</a:t>
+            </a:r>
+            <a:r>
+              <a:rPr lang="en-US" sz="1400" dirty="0">
+                <a:solidFill>
+                  <a:schemeClr val="tx1">
+                    <a:lumMod val="65000"/>
+                    <a:lumOff val="35000"/>
+                  </a:schemeClr>
+                </a:solidFill>
+                <a:latin typeface="+mj-lt"/>
+                <a:ea typeface="Verdana" panose="020B0604030504040204" pitchFamily="34" charset="0"/>
+              </a:rPr>
+              <a:t>. </a:t>
+            </a:r>
+            <a:r>
+              <a:rPr lang="en-US" sz="1400" b="0" i="0" dirty="0">
+                <a:solidFill>
+                  <a:schemeClr val="tx1">
+                    <a:lumMod val="65000"/>
+                    <a:lumOff val="35000"/>
+                  </a:schemeClr>
+                </a:solidFill>
+                <a:effectLst/>
+                <a:latin typeface="+mj-lt"/>
+                <a:ea typeface="Verdana" panose="020B0604030504040204" pitchFamily="34" charset="0"/>
+              </a:rPr>
+              <a:t>San Francisco, CA: No Starch Press. (Chapter </a:t>
+            </a:r>
+            <a:r>
+              <a:rPr lang="en-US" sz="1400" dirty="0">
+                <a:solidFill>
+                  <a:schemeClr val="tx1">
+                    <a:lumMod val="65000"/>
+                    <a:lumOff val="35000"/>
+                  </a:schemeClr>
+                </a:solidFill>
+                <a:latin typeface="+mj-lt"/>
+                <a:ea typeface="Verdana" panose="020B0604030504040204" pitchFamily="34" charset="0"/>
+              </a:rPr>
+              <a:t>20</a:t>
+            </a:r>
+            <a:r>
+              <a:rPr lang="en-US" sz="1400" b="0" i="0" dirty="0">
+                <a:solidFill>
+                  <a:schemeClr val="tx1">
+                    <a:lumMod val="65000"/>
+                    <a:lumOff val="35000"/>
+                  </a:schemeClr>
+                </a:solidFill>
+                <a:effectLst/>
+                <a:latin typeface="+mj-lt"/>
+                <a:ea typeface="Verdana" panose="020B0604030504040204" pitchFamily="34" charset="0"/>
+              </a:rPr>
+              <a:t>)</a:t>
+            </a:r>
+            <a:endParaRPr lang="en-US" sz="1400" dirty="0">
+              <a:solidFill>
+                <a:schemeClr val="tx1">
+                  <a:lumMod val="65000"/>
+                  <a:lumOff val="35000"/>
+                </a:schemeClr>
+              </a:solidFill>
+              <a:latin typeface="+mj-lt"/>
+              <a:ea typeface="Verdana" panose="020B0604030504040204" pitchFamily="34" charset="0"/>
+            </a:endParaRPr>
+          </a:p>
+        </p:txBody>
+      </p:sp>
+      <p:pic>
+        <p:nvPicPr>
+          <p:cNvPr id="6" name="Picture 5">
+            <a:extLst>
+              <a:ext uri="{FF2B5EF4-FFF2-40B4-BE49-F238E27FC236}">
+                <a16:creationId xmlns:a16="http://schemas.microsoft.com/office/drawing/2014/main" id="{6D6EB62B-2AF5-414F-AE49-8A9F33BF1690}"/>
+              </a:ext>
+            </a:extLst>
+          </p:cNvPr>
+          <p:cNvPicPr>
+            <a:picLocks noChangeAspect="1"/>
+          </p:cNvPicPr>
+          <p:nvPr/>
+        </p:nvPicPr>
+        <p:blipFill>
+          <a:blip r:embed="rId3"/>
+          <a:stretch>
+            <a:fillRect/>
+          </a:stretch>
+        </p:blipFill>
+        <p:spPr>
+          <a:xfrm>
+            <a:off x="2694334" y="3645875"/>
+            <a:ext cx="2635250" cy="635000"/>
+          </a:xfrm>
+          <a:prstGeom prst="rect">
+            <a:avLst/>
+          </a:prstGeom>
+          <a:effectLst>
+            <a:outerShdw blurRad="50800" dist="38100" dir="2700000" algn="tl" rotWithShape="0">
+              <a:prstClr val="black">
+                <a:alpha val="40000"/>
+              </a:prstClr>
+            </a:outerShdw>
+          </a:effectLst>
+        </p:spPr>
+      </p:pic>
+      <p:sp>
+        <p:nvSpPr>
+          <p:cNvPr id="20" name="Title 1">
+            <a:extLst>
+              <a:ext uri="{FF2B5EF4-FFF2-40B4-BE49-F238E27FC236}">
+                <a16:creationId xmlns:a16="http://schemas.microsoft.com/office/drawing/2014/main" id="{A768B6E7-76B8-4DF1-9B5C-732BFB29136A}"/>
+              </a:ext>
+            </a:extLst>
+          </p:cNvPr>
+          <p:cNvSpPr>
+            <a:spLocks noGrp="1"/>
+          </p:cNvSpPr>
+          <p:nvPr>
+            <p:ph type="title"/>
+          </p:nvPr>
+        </p:nvSpPr>
+        <p:spPr>
+          <a:xfrm>
+            <a:off x="0" y="793808"/>
+            <a:ext cx="12192000" cy="606943"/>
+          </a:xfrm>
+          <a:noFill/>
+        </p:spPr>
+        <p:txBody>
+          <a:bodyPr>
+            <a:noAutofit/>
+          </a:bodyPr>
+          <a:lstStyle/>
+          <a:p>
+            <a:pPr algn="ctr"/>
+            <a:r>
+              <a:rPr lang="en-US" sz="3600" dirty="0">
+                <a:solidFill>
+                  <a:schemeClr val="tx1">
+                    <a:lumMod val="75000"/>
+                    <a:lumOff val="25000"/>
+                  </a:schemeClr>
+                </a:solidFill>
+                <a:latin typeface="Palatino Linotype" panose="02040502050505030304" pitchFamily="18" charset="0"/>
+              </a:rPr>
+              <a:t>Transformer Attention</a:t>
+            </a:r>
+            <a:endParaRPr lang="en-US" sz="3600" dirty="0">
+              <a:solidFill>
+                <a:schemeClr val="tx1">
+                  <a:lumMod val="75000"/>
+                  <a:lumOff val="25000"/>
+                </a:schemeClr>
+              </a:solidFill>
+              <a:latin typeface="Palatino Linotype" panose="02040502050505030304" pitchFamily="18" charset="0"/>
+              <a:cs typeface="Segoe UI Light" panose="020B0502040204020203" pitchFamily="34" charset="0"/>
+            </a:endParaRPr>
+          </a:p>
+        </p:txBody>
+      </p:sp>
+      <p:pic>
+        <p:nvPicPr>
+          <p:cNvPr id="4" name="Picture 3">
+            <a:extLst>
+              <a:ext uri="{FF2B5EF4-FFF2-40B4-BE49-F238E27FC236}">
+                <a16:creationId xmlns:a16="http://schemas.microsoft.com/office/drawing/2014/main" id="{49A6F357-2B30-46BD-8FDD-0411E11694D1}"/>
+              </a:ext>
+            </a:extLst>
+          </p:cNvPr>
+          <p:cNvPicPr>
+            <a:picLocks noChangeAspect="1"/>
+          </p:cNvPicPr>
+          <p:nvPr/>
+        </p:nvPicPr>
+        <p:blipFill>
+          <a:blip r:embed="rId4"/>
+          <a:stretch>
+            <a:fillRect/>
+          </a:stretch>
+        </p:blipFill>
+        <p:spPr>
+          <a:xfrm>
+            <a:off x="5379858" y="3636516"/>
+            <a:ext cx="1790700" cy="635000"/>
+          </a:xfrm>
+          <a:prstGeom prst="rect">
+            <a:avLst/>
+          </a:prstGeom>
+          <a:effectLst>
+            <a:outerShdw blurRad="50800" dist="38100" dir="2700000" algn="tl" rotWithShape="0">
+              <a:prstClr val="black">
+                <a:alpha val="40000"/>
+              </a:prstClr>
+            </a:outerShdw>
+          </a:effectLst>
+        </p:spPr>
+      </p:pic>
+      <p:pic>
+        <p:nvPicPr>
+          <p:cNvPr id="7" name="Picture 6">
+            <a:extLst>
+              <a:ext uri="{FF2B5EF4-FFF2-40B4-BE49-F238E27FC236}">
+                <a16:creationId xmlns:a16="http://schemas.microsoft.com/office/drawing/2014/main" id="{D5D9F89A-4E53-49F5-A27C-956248F9D86B}"/>
+              </a:ext>
+            </a:extLst>
+          </p:cNvPr>
+          <p:cNvPicPr>
+            <a:picLocks noChangeAspect="1"/>
+          </p:cNvPicPr>
+          <p:nvPr/>
+        </p:nvPicPr>
+        <p:blipFill>
+          <a:blip r:embed="rId5"/>
+          <a:stretch>
+            <a:fillRect/>
+          </a:stretch>
+        </p:blipFill>
+        <p:spPr>
+          <a:xfrm>
+            <a:off x="3928194" y="3059733"/>
+            <a:ext cx="2260600" cy="635000"/>
+          </a:xfrm>
+          <a:prstGeom prst="rect">
+            <a:avLst/>
+          </a:prstGeom>
+          <a:effectLst>
+            <a:outerShdw blurRad="50800" dist="38100" dir="2700000" algn="tl" rotWithShape="0">
+              <a:prstClr val="black">
+                <a:alpha val="40000"/>
+              </a:prstClr>
+            </a:outerShdw>
+          </a:effectLst>
+        </p:spPr>
+      </p:pic>
+      <p:pic>
+        <p:nvPicPr>
+          <p:cNvPr id="11" name="Picture 10">
+            <a:extLst>
+              <a:ext uri="{FF2B5EF4-FFF2-40B4-BE49-F238E27FC236}">
+                <a16:creationId xmlns:a16="http://schemas.microsoft.com/office/drawing/2014/main" id="{64C5ADC0-26B7-477C-8BC1-FD66E3F58AB9}"/>
+              </a:ext>
+            </a:extLst>
+          </p:cNvPr>
+          <p:cNvPicPr>
+            <a:picLocks noChangeAspect="1"/>
+          </p:cNvPicPr>
+          <p:nvPr/>
+        </p:nvPicPr>
+        <p:blipFill>
+          <a:blip r:embed="rId6"/>
+          <a:stretch>
+            <a:fillRect/>
+          </a:stretch>
+        </p:blipFill>
+        <p:spPr>
+          <a:xfrm>
+            <a:off x="6195607" y="3058464"/>
+            <a:ext cx="2755900" cy="635000"/>
+          </a:xfrm>
+          <a:prstGeom prst="rect">
+            <a:avLst/>
+          </a:prstGeom>
+          <a:effectLst>
+            <a:outerShdw blurRad="50800" dist="38100" dir="2700000" algn="tl" rotWithShape="0">
+              <a:prstClr val="black">
+                <a:alpha val="40000"/>
+              </a:prstClr>
+            </a:outerShdw>
+          </a:effectLst>
+        </p:spPr>
+      </p:pic>
+      <p:pic>
+        <p:nvPicPr>
+          <p:cNvPr id="15" name="Picture 14">
+            <a:extLst>
+              <a:ext uri="{FF2B5EF4-FFF2-40B4-BE49-F238E27FC236}">
+                <a16:creationId xmlns:a16="http://schemas.microsoft.com/office/drawing/2014/main" id="{1E147A74-E88F-4F6E-B05A-2153D3561A60}"/>
+              </a:ext>
+            </a:extLst>
+          </p:cNvPr>
+          <p:cNvPicPr>
+            <a:picLocks noChangeAspect="1"/>
+          </p:cNvPicPr>
+          <p:nvPr/>
+        </p:nvPicPr>
+        <p:blipFill>
+          <a:blip r:embed="rId7"/>
+          <a:stretch>
+            <a:fillRect/>
+          </a:stretch>
+        </p:blipFill>
+        <p:spPr>
+          <a:xfrm>
+            <a:off x="7150680" y="3645710"/>
+            <a:ext cx="2451100" cy="635000"/>
+          </a:xfrm>
+          <a:prstGeom prst="rect">
+            <a:avLst/>
+          </a:prstGeom>
+          <a:effectLst>
+            <a:outerShdw blurRad="50800" dist="38100" dir="2700000" algn="tl" rotWithShape="0">
+              <a:prstClr val="black">
+                <a:alpha val="40000"/>
+              </a:prstClr>
+            </a:outerShdw>
+          </a:effectLst>
+        </p:spPr>
+      </p:pic>
+    </p:spTree>
+    <p:extLst>
+      <p:ext uri="{BB962C8B-B14F-4D97-AF65-F5344CB8AC3E}">
+        <p14:creationId xmlns:p14="http://schemas.microsoft.com/office/powerpoint/2010/main" val="3602552699"/>
+      </p:ext>
+    </p:extLst>
+  </p:cSld>
+  <p:clrMapOvr>
+    <a:masterClrMapping/>
+  </p:clrMapOvr>
+  <mc:AlternateContent xmlns:mc="http://schemas.openxmlformats.org/markup-compatibility/2006" xmlns:p14="http://schemas.microsoft.com/office/powerpoint/2010/main">
+    <mc:Choice Requires="p14">
+      <p:transition spd="med" p14:dur="700">
+        <p:fade/>
+      </p:transition>
+    </mc:Choice>
+    <mc:Fallback xmlns="">
+      <p:transition spd="med">
+        <p:fade/>
+      </p:transition>
+    </mc:Fallback>
+  </mc:AlternateContent>
+</p:sld>
+</file>
+
+<file path=ppt/slides/slide20.xml><?xml version="1.0" encoding="utf-8"?>
 <p:sld xmlns:a="http://schemas.openxmlformats.org/drawingml/2006/main" xmlns:r="http://schemas.openxmlformats.org/officeDocument/2006/relationships" xmlns:p="http://schemas.openxmlformats.org/presentationml/2006/main">
   <p:cSld>
     <p:spTree>
@@ -12111,6 +11332,127 @@
           </a:fontRef>
         </p:style>
       </p:cxnSp>
+      <p:sp>
+        <p:nvSpPr>
+          <p:cNvPr id="21" name="TextBox 20">
+            <a:extLst>
+              <a:ext uri="{FF2B5EF4-FFF2-40B4-BE49-F238E27FC236}">
+                <a16:creationId xmlns:a16="http://schemas.microsoft.com/office/drawing/2014/main" id="{8BCC40DE-DCD3-4DB3-860B-2DA0974D6ACA}"/>
+              </a:ext>
+            </a:extLst>
+          </p:cNvPr>
+          <p:cNvSpPr txBox="1"/>
+          <p:nvPr/>
+        </p:nvSpPr>
+        <p:spPr>
+          <a:xfrm>
+            <a:off x="0" y="6550223"/>
+            <a:ext cx="12192000" cy="307777"/>
+          </a:xfrm>
+          <a:prstGeom prst="rect">
+            <a:avLst/>
+          </a:prstGeom>
+          <a:noFill/>
+        </p:spPr>
+        <p:txBody>
+          <a:bodyPr wrap="square" rtlCol="0">
+            <a:spAutoFit/>
+          </a:bodyPr>
+          <a:lstStyle/>
+          <a:p>
+            <a:r>
+              <a:rPr lang="en-US" sz="1400" dirty="0">
+                <a:solidFill>
+                  <a:schemeClr val="tx1">
+                    <a:lumMod val="65000"/>
+                    <a:lumOff val="35000"/>
+                  </a:schemeClr>
+                </a:solidFill>
+                <a:latin typeface="+mj-lt"/>
+                <a:ea typeface="Verdana" panose="020B0604030504040204" pitchFamily="34" charset="0"/>
+              </a:rPr>
+              <a:t>Story Source: Glassner, A. (2021). </a:t>
+            </a:r>
+            <a:r>
+              <a:rPr lang="en-US" sz="1400" i="1" dirty="0">
+                <a:solidFill>
+                  <a:schemeClr val="tx1">
+                    <a:lumMod val="65000"/>
+                    <a:lumOff val="35000"/>
+                  </a:schemeClr>
+                </a:solidFill>
+                <a:latin typeface="+mj-lt"/>
+                <a:ea typeface="Verdana" panose="020B0604030504040204" pitchFamily="34" charset="0"/>
+              </a:rPr>
+              <a:t>Deep learning: A visual approach</a:t>
+            </a:r>
+            <a:r>
+              <a:rPr lang="en-US" sz="1400" dirty="0">
+                <a:solidFill>
+                  <a:schemeClr val="tx1">
+                    <a:lumMod val="65000"/>
+                    <a:lumOff val="35000"/>
+                  </a:schemeClr>
+                </a:solidFill>
+                <a:latin typeface="+mj-lt"/>
+                <a:ea typeface="Verdana" panose="020B0604030504040204" pitchFamily="34" charset="0"/>
+              </a:rPr>
+              <a:t>. </a:t>
+            </a:r>
+            <a:r>
+              <a:rPr lang="en-US" sz="1400" b="0" i="0" dirty="0">
+                <a:solidFill>
+                  <a:schemeClr val="tx1">
+                    <a:lumMod val="65000"/>
+                    <a:lumOff val="35000"/>
+                  </a:schemeClr>
+                </a:solidFill>
+                <a:effectLst/>
+                <a:latin typeface="+mj-lt"/>
+                <a:ea typeface="Verdana" panose="020B0604030504040204" pitchFamily="34" charset="0"/>
+              </a:rPr>
+              <a:t>San Francisco, CA: No Starch Press. (Chapter </a:t>
+            </a:r>
+            <a:r>
+              <a:rPr lang="en-US" sz="1400" dirty="0">
+                <a:solidFill>
+                  <a:schemeClr val="tx1">
+                    <a:lumMod val="65000"/>
+                    <a:lumOff val="35000"/>
+                  </a:schemeClr>
+                </a:solidFill>
+                <a:latin typeface="+mj-lt"/>
+                <a:ea typeface="Verdana" panose="020B0604030504040204" pitchFamily="34" charset="0"/>
+              </a:rPr>
+              <a:t>20</a:t>
+            </a:r>
+            <a:r>
+              <a:rPr lang="en-US" sz="1400" b="0" i="0" dirty="0">
+                <a:solidFill>
+                  <a:schemeClr val="tx1">
+                    <a:lumMod val="65000"/>
+                    <a:lumOff val="35000"/>
+                  </a:schemeClr>
+                </a:solidFill>
+                <a:effectLst/>
+                <a:latin typeface="+mj-lt"/>
+                <a:ea typeface="Verdana" panose="020B0604030504040204" pitchFamily="34" charset="0"/>
+              </a:rPr>
+              <a:t>)</a:t>
+            </a:r>
+            <a:endParaRPr lang="en-US" sz="1400" dirty="0">
+              <a:solidFill>
+                <a:schemeClr val="tx1">
+                  <a:lumMod val="65000"/>
+                  <a:lumOff val="35000"/>
+                </a:schemeClr>
+              </a:solidFill>
+              <a:latin typeface="+mj-lt"/>
+              <a:ea typeface="Verdana" panose="020B0604030504040204" pitchFamily="34" charset="0"/>
+            </a:endParaRPr>
+          </a:p>
+        </p:txBody>
+      </p:sp>
     </p:spTree>
     <p:extLst>
       <p:ext uri="{BB962C8B-B14F-4D97-AF65-F5344CB8AC3E}">
@@ -12690,7 +12032,7 @@
 </p:sld>
 </file>
 
-<file path=ppt/slides/slide22.xml><?xml version="1.0" encoding="utf-8"?>
+<file path=ppt/slides/slide21.xml><?xml version="1.0" encoding="utf-8"?>
 <p:sld xmlns:a="http://schemas.openxmlformats.org/drawingml/2006/main" xmlns:r="http://schemas.openxmlformats.org/officeDocument/2006/relationships" xmlns:p="http://schemas.openxmlformats.org/presentationml/2006/main">
   <p:cSld>
     <p:spTree>
@@ -12882,7 +12224,7 @@
 </p:sld>
 </file>
 
-<file path=ppt/slides/slide23.xml><?xml version="1.0" encoding="utf-8"?>
+<file path=ppt/slides/slide22.xml><?xml version="1.0" encoding="utf-8"?>
 <p:sld xmlns:a="http://schemas.openxmlformats.org/drawingml/2006/main" xmlns:r="http://schemas.openxmlformats.org/officeDocument/2006/relationships" xmlns:p="http://schemas.openxmlformats.org/presentationml/2006/main">
   <p:cSld>
     <p:spTree>
@@ -12921,6 +12263,794 @@
       </p:transition>
     </mc:Fallback>
   </mc:AlternateContent>
+</p:sld>
+</file>
+
+<file path=ppt/slides/slide23.xml><?xml version="1.0" encoding="utf-8"?>
+<p:sld xmlns:a="http://schemas.openxmlformats.org/drawingml/2006/main" xmlns:r="http://schemas.openxmlformats.org/officeDocument/2006/relationships" xmlns:p="http://schemas.openxmlformats.org/presentationml/2006/main">
+  <p:cSld>
+    <p:spTree>
+      <p:nvGrpSpPr>
+        <p:cNvPr id="1" name=""/>
+        <p:cNvGrpSpPr/>
+        <p:nvPr/>
+      </p:nvGrpSpPr>
+      <p:grpSpPr>
+        <a:xfrm>
+          <a:off x="0" y="0"/>
+          <a:ext cx="0" cy="0"/>
+          <a:chOff x="0" y="0"/>
+          <a:chExt cx="0" cy="0"/>
+        </a:xfrm>
+      </p:grpSpPr>
+      <p:sp>
+        <p:nvSpPr>
+          <p:cNvPr id="2" name="Title 1">
+            <a:extLst>
+              <a:ext uri="{FF2B5EF4-FFF2-40B4-BE49-F238E27FC236}">
+                <a16:creationId xmlns:a16="http://schemas.microsoft.com/office/drawing/2014/main" id="{0E138177-E2EE-ACAC-A57C-F03FA29EC836}"/>
+              </a:ext>
+            </a:extLst>
+          </p:cNvPr>
+          <p:cNvSpPr>
+            <a:spLocks noGrp="1"/>
+          </p:cNvSpPr>
+          <p:nvPr>
+            <p:ph type="title"/>
+          </p:nvPr>
+        </p:nvSpPr>
+        <p:spPr/>
+        <p:txBody>
+          <a:bodyPr/>
+          <a:lstStyle/>
+          <a:p>
+            <a:r>
+              <a:rPr lang="en-US" dirty="0">
+                <a:solidFill>
+                  <a:schemeClr val="tx1">
+                    <a:lumMod val="75000"/>
+                    <a:lumOff val="25000"/>
+                  </a:schemeClr>
+                </a:solidFill>
+                <a:latin typeface="Palatino Linotype" panose="02040502050505030304" pitchFamily="18" charset="0"/>
+              </a:rPr>
+              <a:t>Lesson Overview</a:t>
+            </a:r>
+          </a:p>
+        </p:txBody>
+      </p:sp>
+      <p:sp>
+        <p:nvSpPr>
+          <p:cNvPr id="3" name="Content Placeholder 2">
+            <a:extLst>
+              <a:ext uri="{FF2B5EF4-FFF2-40B4-BE49-F238E27FC236}">
+                <a16:creationId xmlns:a16="http://schemas.microsoft.com/office/drawing/2014/main" id="{8626DB86-54B4-A1E2-6C25-C049F364ED25}"/>
+              </a:ext>
+            </a:extLst>
+          </p:cNvPr>
+          <p:cNvSpPr>
+            <a:spLocks noGrp="1"/>
+          </p:cNvSpPr>
+          <p:nvPr>
+            <p:ph idx="1"/>
+          </p:nvPr>
+        </p:nvSpPr>
+        <p:spPr>
+          <a:xfrm>
+            <a:off x="1013564" y="1825626"/>
+            <a:ext cx="10515600" cy="504215"/>
+          </a:xfrm>
+        </p:spPr>
+        <p:txBody>
+          <a:bodyPr/>
+          <a:lstStyle/>
+          <a:p>
+            <a:pPr>
+              <a:buFont typeface="Wingdings" panose="05000000000000000000" pitchFamily="2" charset="2"/>
+              <a:buChar char="Ø"/>
+            </a:pPr>
+            <a:r>
+              <a:rPr lang="en-US" dirty="0">
+                <a:solidFill>
+                  <a:schemeClr val="tx1">
+                    <a:lumMod val="75000"/>
+                    <a:lumOff val="25000"/>
+                  </a:schemeClr>
+                </a:solidFill>
+              </a:rPr>
+              <a:t> </a:t>
+            </a:r>
+            <a:r>
+              <a:rPr lang="en-US" dirty="0">
+                <a:solidFill>
+                  <a:schemeClr val="tx1">
+                    <a:lumMod val="75000"/>
+                    <a:lumOff val="25000"/>
+                  </a:schemeClr>
+                </a:solidFill>
+                <a:latin typeface="Palatino Linotype" panose="02040502050505030304" pitchFamily="18" charset="0"/>
+              </a:rPr>
+              <a:t>Learning Objective 1</a:t>
+            </a:r>
+          </a:p>
+        </p:txBody>
+      </p:sp>
+      <p:sp>
+        <p:nvSpPr>
+          <p:cNvPr id="5" name="Content Placeholder 2">
+            <a:extLst>
+              <a:ext uri="{FF2B5EF4-FFF2-40B4-BE49-F238E27FC236}">
+                <a16:creationId xmlns:a16="http://schemas.microsoft.com/office/drawing/2014/main" id="{7070644F-62DF-8674-4A8A-C2FA1554028E}"/>
+              </a:ext>
+            </a:extLst>
+          </p:cNvPr>
+          <p:cNvSpPr txBox="1">
+            <a:spLocks/>
+          </p:cNvSpPr>
+          <p:nvPr/>
+        </p:nvSpPr>
+        <p:spPr>
+          <a:xfrm>
+            <a:off x="1013564" y="2464778"/>
+            <a:ext cx="10515600" cy="504215"/>
+          </a:xfrm>
+          <a:prstGeom prst="rect">
+            <a:avLst/>
+          </a:prstGeom>
+        </p:spPr>
+        <p:txBody>
+          <a:bodyPr vert="horz" lIns="91440" tIns="45720" rIns="91440" bIns="45720" rtlCol="0">
+            <a:normAutofit/>
+          </a:bodyPr>
+          <a:lstStyle>
+            <a:lvl1pPr marL="228600" indent="-228600" algn="l" defTabSz="914400" rtl="0" eaLnBrk="1" latinLnBrk="0" hangingPunct="1">
+              <a:lnSpc>
+                <a:spcPct val="90000"/>
+              </a:lnSpc>
+              <a:spcBef>
+                <a:spcPts val="1000"/>
+              </a:spcBef>
+              <a:buFont typeface="Arial" panose="020B0604020202020204" pitchFamily="34" charset="0"/>
+              <a:buChar char="•"/>
+              <a:defRPr sz="2800" kern="1200">
+                <a:solidFill>
+                  <a:schemeClr val="tx1"/>
+                </a:solidFill>
+                <a:latin typeface="+mn-lt"/>
+                <a:ea typeface="+mn-ea"/>
+                <a:cs typeface="+mn-cs"/>
+              </a:defRPr>
+            </a:lvl1pPr>
+            <a:lvl2pPr marL="685800" indent="-228600" algn="l" defTabSz="914400" rtl="0" eaLnBrk="1" latinLnBrk="0" hangingPunct="1">
+              <a:lnSpc>
+                <a:spcPct val="90000"/>
+              </a:lnSpc>
+              <a:spcBef>
+                <a:spcPts val="500"/>
+              </a:spcBef>
+              <a:buFont typeface="Arial" panose="020B0604020202020204" pitchFamily="34" charset="0"/>
+              <a:buChar char="•"/>
+              <a:defRPr sz="2400" kern="1200">
+                <a:solidFill>
+                  <a:schemeClr val="tx1"/>
+                </a:solidFill>
+                <a:latin typeface="+mn-lt"/>
+                <a:ea typeface="+mn-ea"/>
+                <a:cs typeface="+mn-cs"/>
+              </a:defRPr>
+            </a:lvl2pPr>
+            <a:lvl3pPr marL="1143000" indent="-228600" algn="l" defTabSz="914400" rtl="0" eaLnBrk="1" latinLnBrk="0" hangingPunct="1">
+              <a:lnSpc>
+                <a:spcPct val="90000"/>
+              </a:lnSpc>
+              <a:spcBef>
+                <a:spcPts val="500"/>
+              </a:spcBef>
+              <a:buFont typeface="Arial" panose="020B0604020202020204" pitchFamily="34" charset="0"/>
+              <a:buChar char="•"/>
+              <a:defRPr sz="2000" kern="1200">
+                <a:solidFill>
+                  <a:schemeClr val="tx1"/>
+                </a:solidFill>
+                <a:latin typeface="+mn-lt"/>
+                <a:ea typeface="+mn-ea"/>
+                <a:cs typeface="+mn-cs"/>
+              </a:defRPr>
+            </a:lvl3pPr>
+            <a:lvl4pPr marL="1600200" indent="-228600" algn="l" defTabSz="914400" rtl="0" eaLnBrk="1" latinLnBrk="0" hangingPunct="1">
+              <a:lnSpc>
+                <a:spcPct val="90000"/>
+              </a:lnSpc>
+              <a:spcBef>
+                <a:spcPts val="500"/>
+              </a:spcBef>
+              <a:buFont typeface="Arial" panose="020B0604020202020204" pitchFamily="34" charset="0"/>
+              <a:buChar char="•"/>
+              <a:defRPr sz="1800" kern="1200">
+                <a:solidFill>
+                  <a:schemeClr val="tx1"/>
+                </a:solidFill>
+                <a:latin typeface="+mn-lt"/>
+                <a:ea typeface="+mn-ea"/>
+                <a:cs typeface="+mn-cs"/>
+              </a:defRPr>
+            </a:lvl4pPr>
+            <a:lvl5pPr marL="2057400" indent="-228600" algn="l" defTabSz="914400" rtl="0" eaLnBrk="1" latinLnBrk="0" hangingPunct="1">
+              <a:lnSpc>
+                <a:spcPct val="90000"/>
+              </a:lnSpc>
+              <a:spcBef>
+                <a:spcPts val="500"/>
+              </a:spcBef>
+              <a:buFont typeface="Arial" panose="020B0604020202020204" pitchFamily="34" charset="0"/>
+              <a:buChar char="•"/>
+              <a:defRPr sz="1800" kern="1200">
+                <a:solidFill>
+                  <a:schemeClr val="tx1"/>
+                </a:solidFill>
+                <a:latin typeface="+mn-lt"/>
+                <a:ea typeface="+mn-ea"/>
+                <a:cs typeface="+mn-cs"/>
+              </a:defRPr>
+            </a:lvl5pPr>
+            <a:lvl6pPr marL="2514600" indent="-228600" algn="l" defTabSz="914400" rtl="0" eaLnBrk="1" latinLnBrk="0" hangingPunct="1">
+              <a:lnSpc>
+                <a:spcPct val="90000"/>
+              </a:lnSpc>
+              <a:spcBef>
+                <a:spcPts val="500"/>
+              </a:spcBef>
+              <a:buFont typeface="Arial" panose="020B0604020202020204" pitchFamily="34" charset="0"/>
+              <a:buChar char="•"/>
+              <a:defRPr sz="1800" kern="1200">
+                <a:solidFill>
+                  <a:schemeClr val="tx1"/>
+                </a:solidFill>
+                <a:latin typeface="+mn-lt"/>
+                <a:ea typeface="+mn-ea"/>
+                <a:cs typeface="+mn-cs"/>
+              </a:defRPr>
+            </a:lvl6pPr>
+            <a:lvl7pPr marL="2971800" indent="-228600" algn="l" defTabSz="914400" rtl="0" eaLnBrk="1" latinLnBrk="0" hangingPunct="1">
+              <a:lnSpc>
+                <a:spcPct val="90000"/>
+              </a:lnSpc>
+              <a:spcBef>
+                <a:spcPts val="500"/>
+              </a:spcBef>
+              <a:buFont typeface="Arial" panose="020B0604020202020204" pitchFamily="34" charset="0"/>
+              <a:buChar char="•"/>
+              <a:defRPr sz="1800" kern="1200">
+                <a:solidFill>
+                  <a:schemeClr val="tx1"/>
+                </a:solidFill>
+                <a:latin typeface="+mn-lt"/>
+                <a:ea typeface="+mn-ea"/>
+                <a:cs typeface="+mn-cs"/>
+              </a:defRPr>
+            </a:lvl7pPr>
+            <a:lvl8pPr marL="3429000" indent="-228600" algn="l" defTabSz="914400" rtl="0" eaLnBrk="1" latinLnBrk="0" hangingPunct="1">
+              <a:lnSpc>
+                <a:spcPct val="90000"/>
+              </a:lnSpc>
+              <a:spcBef>
+                <a:spcPts val="500"/>
+              </a:spcBef>
+              <a:buFont typeface="Arial" panose="020B0604020202020204" pitchFamily="34" charset="0"/>
+              <a:buChar char="•"/>
+              <a:defRPr sz="1800" kern="1200">
+                <a:solidFill>
+                  <a:schemeClr val="tx1"/>
+                </a:solidFill>
+                <a:latin typeface="+mn-lt"/>
+                <a:ea typeface="+mn-ea"/>
+                <a:cs typeface="+mn-cs"/>
+              </a:defRPr>
+            </a:lvl8pPr>
+            <a:lvl9pPr marL="3886200" indent="-228600" algn="l" defTabSz="914400" rtl="0" eaLnBrk="1" latinLnBrk="0" hangingPunct="1">
+              <a:lnSpc>
+                <a:spcPct val="90000"/>
+              </a:lnSpc>
+              <a:spcBef>
+                <a:spcPts val="500"/>
+              </a:spcBef>
+              <a:buFont typeface="Arial" panose="020B0604020202020204" pitchFamily="34" charset="0"/>
+              <a:buChar char="•"/>
+              <a:defRPr sz="1800" kern="1200">
+                <a:solidFill>
+                  <a:schemeClr val="tx1"/>
+                </a:solidFill>
+                <a:latin typeface="+mn-lt"/>
+                <a:ea typeface="+mn-ea"/>
+                <a:cs typeface="+mn-cs"/>
+              </a:defRPr>
+            </a:lvl9pPr>
+          </a:lstStyle>
+          <a:p>
+            <a:pPr>
+              <a:buFont typeface="Wingdings" panose="05000000000000000000" pitchFamily="2" charset="2"/>
+              <a:buChar char="Ø"/>
+            </a:pPr>
+            <a:r>
+              <a:rPr lang="en-US" dirty="0">
+                <a:solidFill>
+                  <a:schemeClr val="tx1">
+                    <a:lumMod val="75000"/>
+                    <a:lumOff val="25000"/>
+                  </a:schemeClr>
+                </a:solidFill>
+              </a:rPr>
+              <a:t> </a:t>
+            </a:r>
+            <a:r>
+              <a:rPr lang="en-US" dirty="0">
+                <a:solidFill>
+                  <a:schemeClr val="tx1">
+                    <a:lumMod val="75000"/>
+                    <a:lumOff val="25000"/>
+                  </a:schemeClr>
+                </a:solidFill>
+                <a:latin typeface="Palatino Linotype" panose="02040502050505030304" pitchFamily="18" charset="0"/>
+              </a:rPr>
+              <a:t>Learning Objective 1</a:t>
+            </a:r>
+          </a:p>
+        </p:txBody>
+      </p:sp>
+      <p:sp>
+        <p:nvSpPr>
+          <p:cNvPr id="6" name="Content Placeholder 2">
+            <a:extLst>
+              <a:ext uri="{FF2B5EF4-FFF2-40B4-BE49-F238E27FC236}">
+                <a16:creationId xmlns:a16="http://schemas.microsoft.com/office/drawing/2014/main" id="{FF2490E1-D7A0-7027-6DCC-60BB6819CD9E}"/>
+              </a:ext>
+            </a:extLst>
+          </p:cNvPr>
+          <p:cNvSpPr txBox="1">
+            <a:spLocks/>
+          </p:cNvSpPr>
+          <p:nvPr/>
+        </p:nvSpPr>
+        <p:spPr>
+          <a:xfrm>
+            <a:off x="1013564" y="3103930"/>
+            <a:ext cx="10515600" cy="504215"/>
+          </a:xfrm>
+          <a:prstGeom prst="rect">
+            <a:avLst/>
+          </a:prstGeom>
+        </p:spPr>
+        <p:txBody>
+          <a:bodyPr vert="horz" lIns="91440" tIns="45720" rIns="91440" bIns="45720" rtlCol="0">
+            <a:normAutofit/>
+          </a:bodyPr>
+          <a:lstStyle>
+            <a:lvl1pPr marL="228600" indent="-228600" algn="l" defTabSz="914400" rtl="0" eaLnBrk="1" latinLnBrk="0" hangingPunct="1">
+              <a:lnSpc>
+                <a:spcPct val="90000"/>
+              </a:lnSpc>
+              <a:spcBef>
+                <a:spcPts val="1000"/>
+              </a:spcBef>
+              <a:buFont typeface="Arial" panose="020B0604020202020204" pitchFamily="34" charset="0"/>
+              <a:buChar char="•"/>
+              <a:defRPr sz="2800" kern="1200">
+                <a:solidFill>
+                  <a:schemeClr val="tx1"/>
+                </a:solidFill>
+                <a:latin typeface="+mn-lt"/>
+                <a:ea typeface="+mn-ea"/>
+                <a:cs typeface="+mn-cs"/>
+              </a:defRPr>
+            </a:lvl1pPr>
+            <a:lvl2pPr marL="685800" indent="-228600" algn="l" defTabSz="914400" rtl="0" eaLnBrk="1" latinLnBrk="0" hangingPunct="1">
+              <a:lnSpc>
+                <a:spcPct val="90000"/>
+              </a:lnSpc>
+              <a:spcBef>
+                <a:spcPts val="500"/>
+              </a:spcBef>
+              <a:buFont typeface="Arial" panose="020B0604020202020204" pitchFamily="34" charset="0"/>
+              <a:buChar char="•"/>
+              <a:defRPr sz="2400" kern="1200">
+                <a:solidFill>
+                  <a:schemeClr val="tx1"/>
+                </a:solidFill>
+                <a:latin typeface="+mn-lt"/>
+                <a:ea typeface="+mn-ea"/>
+                <a:cs typeface="+mn-cs"/>
+              </a:defRPr>
+            </a:lvl2pPr>
+            <a:lvl3pPr marL="1143000" indent="-228600" algn="l" defTabSz="914400" rtl="0" eaLnBrk="1" latinLnBrk="0" hangingPunct="1">
+              <a:lnSpc>
+                <a:spcPct val="90000"/>
+              </a:lnSpc>
+              <a:spcBef>
+                <a:spcPts val="500"/>
+              </a:spcBef>
+              <a:buFont typeface="Arial" panose="020B0604020202020204" pitchFamily="34" charset="0"/>
+              <a:buChar char="•"/>
+              <a:defRPr sz="2000" kern="1200">
+                <a:solidFill>
+                  <a:schemeClr val="tx1"/>
+                </a:solidFill>
+                <a:latin typeface="+mn-lt"/>
+                <a:ea typeface="+mn-ea"/>
+                <a:cs typeface="+mn-cs"/>
+              </a:defRPr>
+            </a:lvl3pPr>
+            <a:lvl4pPr marL="1600200" indent="-228600" algn="l" defTabSz="914400" rtl="0" eaLnBrk="1" latinLnBrk="0" hangingPunct="1">
+              <a:lnSpc>
+                <a:spcPct val="90000"/>
+              </a:lnSpc>
+              <a:spcBef>
+                <a:spcPts val="500"/>
+              </a:spcBef>
+              <a:buFont typeface="Arial" panose="020B0604020202020204" pitchFamily="34" charset="0"/>
+              <a:buChar char="•"/>
+              <a:defRPr sz="1800" kern="1200">
+                <a:solidFill>
+                  <a:schemeClr val="tx1"/>
+                </a:solidFill>
+                <a:latin typeface="+mn-lt"/>
+                <a:ea typeface="+mn-ea"/>
+                <a:cs typeface="+mn-cs"/>
+              </a:defRPr>
+            </a:lvl4pPr>
+            <a:lvl5pPr marL="2057400" indent="-228600" algn="l" defTabSz="914400" rtl="0" eaLnBrk="1" latinLnBrk="0" hangingPunct="1">
+              <a:lnSpc>
+                <a:spcPct val="90000"/>
+              </a:lnSpc>
+              <a:spcBef>
+                <a:spcPts val="500"/>
+              </a:spcBef>
+              <a:buFont typeface="Arial" panose="020B0604020202020204" pitchFamily="34" charset="0"/>
+              <a:buChar char="•"/>
+              <a:defRPr sz="1800" kern="1200">
+                <a:solidFill>
+                  <a:schemeClr val="tx1"/>
+                </a:solidFill>
+                <a:latin typeface="+mn-lt"/>
+                <a:ea typeface="+mn-ea"/>
+                <a:cs typeface="+mn-cs"/>
+              </a:defRPr>
+            </a:lvl5pPr>
+            <a:lvl6pPr marL="2514600" indent="-228600" algn="l" defTabSz="914400" rtl="0" eaLnBrk="1" latinLnBrk="0" hangingPunct="1">
+              <a:lnSpc>
+                <a:spcPct val="90000"/>
+              </a:lnSpc>
+              <a:spcBef>
+                <a:spcPts val="500"/>
+              </a:spcBef>
+              <a:buFont typeface="Arial" panose="020B0604020202020204" pitchFamily="34" charset="0"/>
+              <a:buChar char="•"/>
+              <a:defRPr sz="1800" kern="1200">
+                <a:solidFill>
+                  <a:schemeClr val="tx1"/>
+                </a:solidFill>
+                <a:latin typeface="+mn-lt"/>
+                <a:ea typeface="+mn-ea"/>
+                <a:cs typeface="+mn-cs"/>
+              </a:defRPr>
+            </a:lvl6pPr>
+            <a:lvl7pPr marL="2971800" indent="-228600" algn="l" defTabSz="914400" rtl="0" eaLnBrk="1" latinLnBrk="0" hangingPunct="1">
+              <a:lnSpc>
+                <a:spcPct val="90000"/>
+              </a:lnSpc>
+              <a:spcBef>
+                <a:spcPts val="500"/>
+              </a:spcBef>
+              <a:buFont typeface="Arial" panose="020B0604020202020204" pitchFamily="34" charset="0"/>
+              <a:buChar char="•"/>
+              <a:defRPr sz="1800" kern="1200">
+                <a:solidFill>
+                  <a:schemeClr val="tx1"/>
+                </a:solidFill>
+                <a:latin typeface="+mn-lt"/>
+                <a:ea typeface="+mn-ea"/>
+                <a:cs typeface="+mn-cs"/>
+              </a:defRPr>
+            </a:lvl7pPr>
+            <a:lvl8pPr marL="3429000" indent="-228600" algn="l" defTabSz="914400" rtl="0" eaLnBrk="1" latinLnBrk="0" hangingPunct="1">
+              <a:lnSpc>
+                <a:spcPct val="90000"/>
+              </a:lnSpc>
+              <a:spcBef>
+                <a:spcPts val="500"/>
+              </a:spcBef>
+              <a:buFont typeface="Arial" panose="020B0604020202020204" pitchFamily="34" charset="0"/>
+              <a:buChar char="•"/>
+              <a:defRPr sz="1800" kern="1200">
+                <a:solidFill>
+                  <a:schemeClr val="tx1"/>
+                </a:solidFill>
+                <a:latin typeface="+mn-lt"/>
+                <a:ea typeface="+mn-ea"/>
+                <a:cs typeface="+mn-cs"/>
+              </a:defRPr>
+            </a:lvl8pPr>
+            <a:lvl9pPr marL="3886200" indent="-228600" algn="l" defTabSz="914400" rtl="0" eaLnBrk="1" latinLnBrk="0" hangingPunct="1">
+              <a:lnSpc>
+                <a:spcPct val="90000"/>
+              </a:lnSpc>
+              <a:spcBef>
+                <a:spcPts val="500"/>
+              </a:spcBef>
+              <a:buFont typeface="Arial" panose="020B0604020202020204" pitchFamily="34" charset="0"/>
+              <a:buChar char="•"/>
+              <a:defRPr sz="1800" kern="1200">
+                <a:solidFill>
+                  <a:schemeClr val="tx1"/>
+                </a:solidFill>
+                <a:latin typeface="+mn-lt"/>
+                <a:ea typeface="+mn-ea"/>
+                <a:cs typeface="+mn-cs"/>
+              </a:defRPr>
+            </a:lvl9pPr>
+          </a:lstStyle>
+          <a:p>
+            <a:pPr>
+              <a:buFont typeface="Wingdings" panose="05000000000000000000" pitchFamily="2" charset="2"/>
+              <a:buChar char="Ø"/>
+            </a:pPr>
+            <a:r>
+              <a:rPr lang="en-US" dirty="0">
+                <a:solidFill>
+                  <a:schemeClr val="tx1">
+                    <a:lumMod val="75000"/>
+                    <a:lumOff val="25000"/>
+                  </a:schemeClr>
+                </a:solidFill>
+              </a:rPr>
+              <a:t> </a:t>
+            </a:r>
+            <a:r>
+              <a:rPr lang="en-US" dirty="0">
+                <a:solidFill>
+                  <a:schemeClr val="tx1">
+                    <a:lumMod val="75000"/>
+                    <a:lumOff val="25000"/>
+                  </a:schemeClr>
+                </a:solidFill>
+                <a:latin typeface="Palatino Linotype" panose="02040502050505030304" pitchFamily="18" charset="0"/>
+              </a:rPr>
+              <a:t>Learning Objective 1</a:t>
+            </a:r>
+          </a:p>
+        </p:txBody>
+      </p:sp>
+      <p:sp>
+        <p:nvSpPr>
+          <p:cNvPr id="7" name="Content Placeholder 2">
+            <a:extLst>
+              <a:ext uri="{FF2B5EF4-FFF2-40B4-BE49-F238E27FC236}">
+                <a16:creationId xmlns:a16="http://schemas.microsoft.com/office/drawing/2014/main" id="{6D3279E5-D518-B484-9FCF-B12663A4E8FF}"/>
+              </a:ext>
+            </a:extLst>
+          </p:cNvPr>
+          <p:cNvSpPr txBox="1">
+            <a:spLocks/>
+          </p:cNvSpPr>
+          <p:nvPr/>
+        </p:nvSpPr>
+        <p:spPr>
+          <a:xfrm>
+            <a:off x="1013564" y="3743082"/>
+            <a:ext cx="10515600" cy="504215"/>
+          </a:xfrm>
+          <a:prstGeom prst="rect">
+            <a:avLst/>
+          </a:prstGeom>
+        </p:spPr>
+        <p:txBody>
+          <a:bodyPr vert="horz" lIns="91440" tIns="45720" rIns="91440" bIns="45720" rtlCol="0">
+            <a:normAutofit/>
+          </a:bodyPr>
+          <a:lstStyle>
+            <a:lvl1pPr marL="228600" indent="-228600" algn="l" defTabSz="914400" rtl="0" eaLnBrk="1" latinLnBrk="0" hangingPunct="1">
+              <a:lnSpc>
+                <a:spcPct val="90000"/>
+              </a:lnSpc>
+              <a:spcBef>
+                <a:spcPts val="1000"/>
+              </a:spcBef>
+              <a:buFont typeface="Arial" panose="020B0604020202020204" pitchFamily="34" charset="0"/>
+              <a:buChar char="•"/>
+              <a:defRPr sz="2800" kern="1200">
+                <a:solidFill>
+                  <a:schemeClr val="tx1"/>
+                </a:solidFill>
+                <a:latin typeface="+mn-lt"/>
+                <a:ea typeface="+mn-ea"/>
+                <a:cs typeface="+mn-cs"/>
+              </a:defRPr>
+            </a:lvl1pPr>
+            <a:lvl2pPr marL="685800" indent="-228600" algn="l" defTabSz="914400" rtl="0" eaLnBrk="1" latinLnBrk="0" hangingPunct="1">
+              <a:lnSpc>
+                <a:spcPct val="90000"/>
+              </a:lnSpc>
+              <a:spcBef>
+                <a:spcPts val="500"/>
+              </a:spcBef>
+              <a:buFont typeface="Arial" panose="020B0604020202020204" pitchFamily="34" charset="0"/>
+              <a:buChar char="•"/>
+              <a:defRPr sz="2400" kern="1200">
+                <a:solidFill>
+                  <a:schemeClr val="tx1"/>
+                </a:solidFill>
+                <a:latin typeface="+mn-lt"/>
+                <a:ea typeface="+mn-ea"/>
+                <a:cs typeface="+mn-cs"/>
+              </a:defRPr>
+            </a:lvl2pPr>
+            <a:lvl3pPr marL="1143000" indent="-228600" algn="l" defTabSz="914400" rtl="0" eaLnBrk="1" latinLnBrk="0" hangingPunct="1">
+              <a:lnSpc>
+                <a:spcPct val="90000"/>
+              </a:lnSpc>
+              <a:spcBef>
+                <a:spcPts val="500"/>
+              </a:spcBef>
+              <a:buFont typeface="Arial" panose="020B0604020202020204" pitchFamily="34" charset="0"/>
+              <a:buChar char="•"/>
+              <a:defRPr sz="2000" kern="1200">
+                <a:solidFill>
+                  <a:schemeClr val="tx1"/>
+                </a:solidFill>
+                <a:latin typeface="+mn-lt"/>
+                <a:ea typeface="+mn-ea"/>
+                <a:cs typeface="+mn-cs"/>
+              </a:defRPr>
+            </a:lvl3pPr>
+            <a:lvl4pPr marL="1600200" indent="-228600" algn="l" defTabSz="914400" rtl="0" eaLnBrk="1" latinLnBrk="0" hangingPunct="1">
+              <a:lnSpc>
+                <a:spcPct val="90000"/>
+              </a:lnSpc>
+              <a:spcBef>
+                <a:spcPts val="500"/>
+              </a:spcBef>
+              <a:buFont typeface="Arial" panose="020B0604020202020204" pitchFamily="34" charset="0"/>
+              <a:buChar char="•"/>
+              <a:defRPr sz="1800" kern="1200">
+                <a:solidFill>
+                  <a:schemeClr val="tx1"/>
+                </a:solidFill>
+                <a:latin typeface="+mn-lt"/>
+                <a:ea typeface="+mn-ea"/>
+                <a:cs typeface="+mn-cs"/>
+              </a:defRPr>
+            </a:lvl4pPr>
+            <a:lvl5pPr marL="2057400" indent="-228600" algn="l" defTabSz="914400" rtl="0" eaLnBrk="1" latinLnBrk="0" hangingPunct="1">
+              <a:lnSpc>
+                <a:spcPct val="90000"/>
+              </a:lnSpc>
+              <a:spcBef>
+                <a:spcPts val="500"/>
+              </a:spcBef>
+              <a:buFont typeface="Arial" panose="020B0604020202020204" pitchFamily="34" charset="0"/>
+              <a:buChar char="•"/>
+              <a:defRPr sz="1800" kern="1200">
+                <a:solidFill>
+                  <a:schemeClr val="tx1"/>
+                </a:solidFill>
+                <a:latin typeface="+mn-lt"/>
+                <a:ea typeface="+mn-ea"/>
+                <a:cs typeface="+mn-cs"/>
+              </a:defRPr>
+            </a:lvl5pPr>
+            <a:lvl6pPr marL="2514600" indent="-228600" algn="l" defTabSz="914400" rtl="0" eaLnBrk="1" latinLnBrk="0" hangingPunct="1">
+              <a:lnSpc>
+                <a:spcPct val="90000"/>
+              </a:lnSpc>
+              <a:spcBef>
+                <a:spcPts val="500"/>
+              </a:spcBef>
+              <a:buFont typeface="Arial" panose="020B0604020202020204" pitchFamily="34" charset="0"/>
+              <a:buChar char="•"/>
+              <a:defRPr sz="1800" kern="1200">
+                <a:solidFill>
+                  <a:schemeClr val="tx1"/>
+                </a:solidFill>
+                <a:latin typeface="+mn-lt"/>
+                <a:ea typeface="+mn-ea"/>
+                <a:cs typeface="+mn-cs"/>
+              </a:defRPr>
+            </a:lvl6pPr>
+            <a:lvl7pPr marL="2971800" indent="-228600" algn="l" defTabSz="914400" rtl="0" eaLnBrk="1" latinLnBrk="0" hangingPunct="1">
+              <a:lnSpc>
+                <a:spcPct val="90000"/>
+              </a:lnSpc>
+              <a:spcBef>
+                <a:spcPts val="500"/>
+              </a:spcBef>
+              <a:buFont typeface="Arial" panose="020B0604020202020204" pitchFamily="34" charset="0"/>
+              <a:buChar char="•"/>
+              <a:defRPr sz="1800" kern="1200">
+                <a:solidFill>
+                  <a:schemeClr val="tx1"/>
+                </a:solidFill>
+                <a:latin typeface="+mn-lt"/>
+                <a:ea typeface="+mn-ea"/>
+                <a:cs typeface="+mn-cs"/>
+              </a:defRPr>
+            </a:lvl7pPr>
+            <a:lvl8pPr marL="3429000" indent="-228600" algn="l" defTabSz="914400" rtl="0" eaLnBrk="1" latinLnBrk="0" hangingPunct="1">
+              <a:lnSpc>
+                <a:spcPct val="90000"/>
+              </a:lnSpc>
+              <a:spcBef>
+                <a:spcPts val="500"/>
+              </a:spcBef>
+              <a:buFont typeface="Arial" panose="020B0604020202020204" pitchFamily="34" charset="0"/>
+              <a:buChar char="•"/>
+              <a:defRPr sz="1800" kern="1200">
+                <a:solidFill>
+                  <a:schemeClr val="tx1"/>
+                </a:solidFill>
+                <a:latin typeface="+mn-lt"/>
+                <a:ea typeface="+mn-ea"/>
+                <a:cs typeface="+mn-cs"/>
+              </a:defRPr>
+            </a:lvl8pPr>
+            <a:lvl9pPr marL="3886200" indent="-228600" algn="l" defTabSz="914400" rtl="0" eaLnBrk="1" latinLnBrk="0" hangingPunct="1">
+              <a:lnSpc>
+                <a:spcPct val="90000"/>
+              </a:lnSpc>
+              <a:spcBef>
+                <a:spcPts val="500"/>
+              </a:spcBef>
+              <a:buFont typeface="Arial" panose="020B0604020202020204" pitchFamily="34" charset="0"/>
+              <a:buChar char="•"/>
+              <a:defRPr sz="1800" kern="1200">
+                <a:solidFill>
+                  <a:schemeClr val="tx1"/>
+                </a:solidFill>
+                <a:latin typeface="+mn-lt"/>
+                <a:ea typeface="+mn-ea"/>
+                <a:cs typeface="+mn-cs"/>
+              </a:defRPr>
+            </a:lvl9pPr>
+          </a:lstStyle>
+          <a:p>
+            <a:pPr>
+              <a:buFont typeface="Wingdings" panose="05000000000000000000" pitchFamily="2" charset="2"/>
+              <a:buChar char="Ø"/>
+            </a:pPr>
+            <a:r>
+              <a:rPr lang="en-US" dirty="0">
+                <a:solidFill>
+                  <a:schemeClr val="tx1">
+                    <a:lumMod val="75000"/>
+                    <a:lumOff val="25000"/>
+                  </a:schemeClr>
+                </a:solidFill>
+              </a:rPr>
+              <a:t> </a:t>
+            </a:r>
+            <a:r>
+              <a:rPr lang="en-US" dirty="0">
+                <a:solidFill>
+                  <a:schemeClr val="tx1">
+                    <a:lumMod val="75000"/>
+                    <a:lumOff val="25000"/>
+                  </a:schemeClr>
+                </a:solidFill>
+                <a:latin typeface="Palatino Linotype" panose="02040502050505030304" pitchFamily="18" charset="0"/>
+              </a:rPr>
+              <a:t>Learning Objective 1</a:t>
+            </a:r>
+          </a:p>
+        </p:txBody>
+      </p:sp>
+    </p:spTree>
+    <p:extLst>
+      <p:ext uri="{BB962C8B-B14F-4D97-AF65-F5344CB8AC3E}">
+        <p14:creationId xmlns:p14="http://schemas.microsoft.com/office/powerpoint/2010/main" val="1416141381"/>
+      </p:ext>
+    </p:extLst>
+  </p:cSld>
+  <p:clrMapOvr>
+    <a:masterClrMapping/>
+  </p:clrMapOvr>
 </p:sld>
 </file>
 
@@ -13068,409 +13198,6 @@
 </file>
 
 <file path=ppt/slides/slide3.xml><?xml version="1.0" encoding="utf-8"?>
-<p:sld xmlns:a="http://schemas.openxmlformats.org/drawingml/2006/main" xmlns:r="http://schemas.openxmlformats.org/officeDocument/2006/relationships" xmlns:p="http://schemas.openxmlformats.org/presentationml/2006/main">
-  <p:cSld>
-    <p:spTree>
-      <p:nvGrpSpPr>
-        <p:cNvPr id="1" name=""/>
-        <p:cNvGrpSpPr/>
-        <p:nvPr/>
-      </p:nvGrpSpPr>
-      <p:grpSpPr>
-        <a:xfrm>
-          <a:off x="0" y="0"/>
-          <a:ext cx="0" cy="0"/>
-          <a:chOff x="0" y="0"/>
-          <a:chExt cx="0" cy="0"/>
-        </a:xfrm>
-      </p:grpSpPr>
-      <p:sp>
-        <p:nvSpPr>
-          <p:cNvPr id="3" name="TextBox 2">
-            <a:extLst>
-              <a:ext uri="{FF2B5EF4-FFF2-40B4-BE49-F238E27FC236}">
-                <a16:creationId xmlns:a16="http://schemas.microsoft.com/office/drawing/2014/main" id="{C1E53685-A9F7-4FE0-ABDB-9B755F275882}"/>
-              </a:ext>
-            </a:extLst>
-          </p:cNvPr>
-          <p:cNvSpPr txBox="1"/>
-          <p:nvPr/>
-        </p:nvSpPr>
-        <p:spPr>
-          <a:xfrm>
-            <a:off x="0" y="6550223"/>
-            <a:ext cx="12192000" cy="307777"/>
-          </a:xfrm>
-          <a:prstGeom prst="rect">
-            <a:avLst/>
-          </a:prstGeom>
-          <a:noFill/>
-        </p:spPr>
-        <p:txBody>
-          <a:bodyPr wrap="square" rtlCol="0">
-            <a:spAutoFit/>
-          </a:bodyPr>
-          <a:lstStyle/>
-          <a:p>
-            <a:r>
-              <a:rPr lang="en-US" sz="1400" dirty="0">
-                <a:solidFill>
-                  <a:schemeClr val="tx1">
-                    <a:lumMod val="65000"/>
-                    <a:lumOff val="35000"/>
-                  </a:schemeClr>
-                </a:solidFill>
-                <a:latin typeface="+mj-lt"/>
-                <a:ea typeface="Verdana" panose="020B0604030504040204" pitchFamily="34" charset="0"/>
-              </a:rPr>
-              <a:t>Source: Glassner, A. (2021). </a:t>
-            </a:r>
-            <a:r>
-              <a:rPr lang="en-US" sz="1400" i="1" dirty="0">
-                <a:solidFill>
-                  <a:schemeClr val="tx1">
-                    <a:lumMod val="65000"/>
-                    <a:lumOff val="35000"/>
-                  </a:schemeClr>
-                </a:solidFill>
-                <a:latin typeface="+mj-lt"/>
-                <a:ea typeface="Verdana" panose="020B0604030504040204" pitchFamily="34" charset="0"/>
-              </a:rPr>
-              <a:t>Deep learning: A visual approach</a:t>
-            </a:r>
-            <a:r>
-              <a:rPr lang="en-US" sz="1400" dirty="0">
-                <a:solidFill>
-                  <a:schemeClr val="tx1">
-                    <a:lumMod val="65000"/>
-                    <a:lumOff val="35000"/>
-                  </a:schemeClr>
-                </a:solidFill>
-                <a:latin typeface="+mj-lt"/>
-                <a:ea typeface="Verdana" panose="020B0604030504040204" pitchFamily="34" charset="0"/>
-              </a:rPr>
-              <a:t>. </a:t>
-            </a:r>
-            <a:r>
-              <a:rPr lang="en-US" sz="1400" b="0" i="0" dirty="0">
-                <a:solidFill>
-                  <a:schemeClr val="tx1">
-                    <a:lumMod val="65000"/>
-                    <a:lumOff val="35000"/>
-                  </a:schemeClr>
-                </a:solidFill>
-                <a:effectLst/>
-                <a:latin typeface="+mj-lt"/>
-                <a:ea typeface="Verdana" panose="020B0604030504040204" pitchFamily="34" charset="0"/>
-              </a:rPr>
-              <a:t>San Francisco, CA: No Starch Press. (Chapter </a:t>
-            </a:r>
-            <a:r>
-              <a:rPr lang="en-US" sz="1400" dirty="0">
-                <a:solidFill>
-                  <a:schemeClr val="tx1">
-                    <a:lumMod val="65000"/>
-                    <a:lumOff val="35000"/>
-                  </a:schemeClr>
-                </a:solidFill>
-                <a:latin typeface="+mj-lt"/>
-                <a:ea typeface="Verdana" panose="020B0604030504040204" pitchFamily="34" charset="0"/>
-              </a:rPr>
-              <a:t>20</a:t>
-            </a:r>
-            <a:r>
-              <a:rPr lang="en-US" sz="1400" b="0" i="0" dirty="0">
-                <a:solidFill>
-                  <a:schemeClr val="tx1">
-                    <a:lumMod val="65000"/>
-                    <a:lumOff val="35000"/>
-                  </a:schemeClr>
-                </a:solidFill>
-                <a:effectLst/>
-                <a:latin typeface="+mj-lt"/>
-                <a:ea typeface="Verdana" panose="020B0604030504040204" pitchFamily="34" charset="0"/>
-              </a:rPr>
-              <a:t>)</a:t>
-            </a:r>
-            <a:endParaRPr lang="en-US" sz="1400" dirty="0">
-              <a:solidFill>
-                <a:schemeClr val="tx1">
-                  <a:lumMod val="65000"/>
-                  <a:lumOff val="35000"/>
-                </a:schemeClr>
-              </a:solidFill>
-              <a:latin typeface="+mj-lt"/>
-              <a:ea typeface="Verdana" panose="020B0604030504040204" pitchFamily="34" charset="0"/>
-            </a:endParaRPr>
-          </a:p>
-        </p:txBody>
-      </p:sp>
-      <p:pic>
-        <p:nvPicPr>
-          <p:cNvPr id="6" name="Picture 5">
-            <a:extLst>
-              <a:ext uri="{FF2B5EF4-FFF2-40B4-BE49-F238E27FC236}">
-                <a16:creationId xmlns:a16="http://schemas.microsoft.com/office/drawing/2014/main" id="{6D6EB62B-2AF5-414F-AE49-8A9F33BF1690}"/>
-              </a:ext>
-            </a:extLst>
-          </p:cNvPr>
-          <p:cNvPicPr>
-            <a:picLocks noChangeAspect="1"/>
-          </p:cNvPicPr>
-          <p:nvPr/>
-        </p:nvPicPr>
-        <p:blipFill>
-          <a:blip r:embed="rId3"/>
-          <a:stretch>
-            <a:fillRect/>
-          </a:stretch>
-        </p:blipFill>
-        <p:spPr>
-          <a:xfrm>
-            <a:off x="2694334" y="3645875"/>
-            <a:ext cx="2635250" cy="635000"/>
-          </a:xfrm>
-          <a:prstGeom prst="rect">
-            <a:avLst/>
-          </a:prstGeom>
-          <a:effectLst>
-            <a:outerShdw blurRad="50800" dist="38100" dir="2700000" algn="tl" rotWithShape="0">
-              <a:prstClr val="black">
-                <a:alpha val="40000"/>
-              </a:prstClr>
-            </a:outerShdw>
-          </a:effectLst>
-        </p:spPr>
-      </p:pic>
-      <p:sp>
-        <p:nvSpPr>
-          <p:cNvPr id="20" name="Title 1">
-            <a:extLst>
-              <a:ext uri="{FF2B5EF4-FFF2-40B4-BE49-F238E27FC236}">
-                <a16:creationId xmlns:a16="http://schemas.microsoft.com/office/drawing/2014/main" id="{A768B6E7-76B8-4DF1-9B5C-732BFB29136A}"/>
-              </a:ext>
-            </a:extLst>
-          </p:cNvPr>
-          <p:cNvSpPr>
-            <a:spLocks noGrp="1"/>
-          </p:cNvSpPr>
-          <p:nvPr>
-            <p:ph type="title"/>
-          </p:nvPr>
-        </p:nvSpPr>
-        <p:spPr>
-          <a:xfrm>
-            <a:off x="0" y="793808"/>
-            <a:ext cx="12192000" cy="606943"/>
-          </a:xfrm>
-          <a:noFill/>
-        </p:spPr>
-        <p:txBody>
-          <a:bodyPr>
-            <a:noAutofit/>
-          </a:bodyPr>
-          <a:lstStyle/>
-          <a:p>
-            <a:pPr algn="ctr"/>
-            <a:r>
-              <a:rPr lang="en-US" sz="3600" dirty="0">
-                <a:solidFill>
-                  <a:schemeClr val="tx1">
-                    <a:lumMod val="75000"/>
-                    <a:lumOff val="25000"/>
-                  </a:schemeClr>
-                </a:solidFill>
-                <a:latin typeface="Palatino Linotype" panose="02040502050505030304" pitchFamily="18" charset="0"/>
-              </a:rPr>
-              <a:t>Transformer Attention</a:t>
-            </a:r>
-            <a:endParaRPr lang="en-US" sz="3600" dirty="0">
-              <a:solidFill>
-                <a:schemeClr val="tx1">
-                  <a:lumMod val="75000"/>
-                  <a:lumOff val="25000"/>
-                </a:schemeClr>
-              </a:solidFill>
-              <a:latin typeface="Palatino Linotype" panose="02040502050505030304" pitchFamily="18" charset="0"/>
-              <a:cs typeface="Segoe UI Light" panose="020B0502040204020203" pitchFamily="34" charset="0"/>
-            </a:endParaRPr>
-          </a:p>
-        </p:txBody>
-      </p:sp>
-      <p:pic>
-        <p:nvPicPr>
-          <p:cNvPr id="4" name="Picture 3">
-            <a:extLst>
-              <a:ext uri="{FF2B5EF4-FFF2-40B4-BE49-F238E27FC236}">
-                <a16:creationId xmlns:a16="http://schemas.microsoft.com/office/drawing/2014/main" id="{49A6F357-2B30-46BD-8FDD-0411E11694D1}"/>
-              </a:ext>
-            </a:extLst>
-          </p:cNvPr>
-          <p:cNvPicPr>
-            <a:picLocks noChangeAspect="1"/>
-          </p:cNvPicPr>
-          <p:nvPr/>
-        </p:nvPicPr>
-        <p:blipFill>
-          <a:blip r:embed="rId4"/>
-          <a:stretch>
-            <a:fillRect/>
-          </a:stretch>
-        </p:blipFill>
-        <p:spPr>
-          <a:xfrm>
-            <a:off x="5379858" y="3636516"/>
-            <a:ext cx="1790700" cy="635000"/>
-          </a:xfrm>
-          <a:prstGeom prst="rect">
-            <a:avLst/>
-          </a:prstGeom>
-          <a:effectLst>
-            <a:outerShdw blurRad="50800" dist="38100" dir="2700000" algn="tl" rotWithShape="0">
-              <a:prstClr val="black">
-                <a:alpha val="40000"/>
-              </a:prstClr>
-            </a:outerShdw>
-          </a:effectLst>
-        </p:spPr>
-      </p:pic>
-      <p:pic>
-        <p:nvPicPr>
-          <p:cNvPr id="7" name="Picture 6">
-            <a:extLst>
-              <a:ext uri="{FF2B5EF4-FFF2-40B4-BE49-F238E27FC236}">
-                <a16:creationId xmlns:a16="http://schemas.microsoft.com/office/drawing/2014/main" id="{D5D9F89A-4E53-49F5-A27C-956248F9D86B}"/>
-              </a:ext>
-            </a:extLst>
-          </p:cNvPr>
-          <p:cNvPicPr>
-            <a:picLocks noChangeAspect="1"/>
-          </p:cNvPicPr>
-          <p:nvPr/>
-        </p:nvPicPr>
-        <p:blipFill>
-          <a:blip r:embed="rId5"/>
-          <a:stretch>
-            <a:fillRect/>
-          </a:stretch>
-        </p:blipFill>
-        <p:spPr>
-          <a:xfrm>
-            <a:off x="3928194" y="3059733"/>
-            <a:ext cx="2260600" cy="635000"/>
-          </a:xfrm>
-          <a:prstGeom prst="rect">
-            <a:avLst/>
-          </a:prstGeom>
-          <a:effectLst>
-            <a:outerShdw blurRad="50800" dist="38100" dir="2700000" algn="tl" rotWithShape="0">
-              <a:prstClr val="black">
-                <a:alpha val="40000"/>
-              </a:prstClr>
-            </a:outerShdw>
-          </a:effectLst>
-        </p:spPr>
-      </p:pic>
-      <p:pic>
-        <p:nvPicPr>
-          <p:cNvPr id="11" name="Picture 10">
-            <a:extLst>
-              <a:ext uri="{FF2B5EF4-FFF2-40B4-BE49-F238E27FC236}">
-                <a16:creationId xmlns:a16="http://schemas.microsoft.com/office/drawing/2014/main" id="{64C5ADC0-26B7-477C-8BC1-FD66E3F58AB9}"/>
-              </a:ext>
-            </a:extLst>
-          </p:cNvPr>
-          <p:cNvPicPr>
-            <a:picLocks noChangeAspect="1"/>
-          </p:cNvPicPr>
-          <p:nvPr/>
-        </p:nvPicPr>
-        <p:blipFill>
-          <a:blip r:embed="rId6"/>
-          <a:stretch>
-            <a:fillRect/>
-          </a:stretch>
-        </p:blipFill>
-        <p:spPr>
-          <a:xfrm>
-            <a:off x="6195607" y="3058464"/>
-            <a:ext cx="2755900" cy="635000"/>
-          </a:xfrm>
-          <a:prstGeom prst="rect">
-            <a:avLst/>
-          </a:prstGeom>
-          <a:effectLst>
-            <a:outerShdw blurRad="50800" dist="38100" dir="2700000" algn="tl" rotWithShape="0">
-              <a:prstClr val="black">
-                <a:alpha val="40000"/>
-              </a:prstClr>
-            </a:outerShdw>
-          </a:effectLst>
-        </p:spPr>
-      </p:pic>
-      <p:pic>
-        <p:nvPicPr>
-          <p:cNvPr id="15" name="Picture 14">
-            <a:extLst>
-              <a:ext uri="{FF2B5EF4-FFF2-40B4-BE49-F238E27FC236}">
-                <a16:creationId xmlns:a16="http://schemas.microsoft.com/office/drawing/2014/main" id="{1E147A74-E88F-4F6E-B05A-2153D3561A60}"/>
-              </a:ext>
-            </a:extLst>
-          </p:cNvPr>
-          <p:cNvPicPr>
-            <a:picLocks noChangeAspect="1"/>
-          </p:cNvPicPr>
-          <p:nvPr/>
-        </p:nvPicPr>
-        <p:blipFill>
-          <a:blip r:embed="rId7"/>
-          <a:stretch>
-            <a:fillRect/>
-          </a:stretch>
-        </p:blipFill>
-        <p:spPr>
-          <a:xfrm>
-            <a:off x="7150680" y="3645710"/>
-            <a:ext cx="2451100" cy="635000"/>
-          </a:xfrm>
-          <a:prstGeom prst="rect">
-            <a:avLst/>
-          </a:prstGeom>
-          <a:effectLst>
-            <a:outerShdw blurRad="50800" dist="38100" dir="2700000" algn="tl" rotWithShape="0">
-              <a:prstClr val="black">
-                <a:alpha val="40000"/>
-              </a:prstClr>
-            </a:outerShdw>
-          </a:effectLst>
-        </p:spPr>
-      </p:pic>
-    </p:spTree>
-    <p:extLst>
-      <p:ext uri="{BB962C8B-B14F-4D97-AF65-F5344CB8AC3E}">
-        <p14:creationId xmlns:p14="http://schemas.microsoft.com/office/powerpoint/2010/main" val="3602552699"/>
-      </p:ext>
-    </p:extLst>
-  </p:cSld>
-  <p:clrMapOvr>
-    <a:masterClrMapping/>
-  </p:clrMapOvr>
-  <mc:AlternateContent xmlns:mc="http://schemas.openxmlformats.org/markup-compatibility/2006" xmlns:p14="http://schemas.microsoft.com/office/powerpoint/2010/main">
-    <mc:Choice Requires="p14">
-      <p:transition spd="med" p14:dur="700">
-        <p:fade/>
-      </p:transition>
-    </mc:Choice>
-    <mc:Fallback xmlns="">
-      <p:transition spd="med">
-        <p:fade/>
-      </p:transition>
-    </mc:Fallback>
-  </mc:AlternateContent>
-</p:sld>
-</file>
-
-<file path=ppt/slides/slide4.xml><?xml version="1.0" encoding="utf-8"?>
 <p:sld xmlns:a="http://schemas.openxmlformats.org/drawingml/2006/main" xmlns:r="http://schemas.openxmlformats.org/officeDocument/2006/relationships" xmlns:p="http://schemas.openxmlformats.org/presentationml/2006/main">
   <p:cSld>
     <p:spTree>
@@ -13668,7 +13395,7 @@
 </p:sld>
 </file>
 
-<file path=ppt/slides/slide5.xml><?xml version="1.0" encoding="utf-8"?>
+<file path=ppt/slides/slide4.xml><?xml version="1.0" encoding="utf-8"?>
 <p:sld xmlns:a="http://schemas.openxmlformats.org/drawingml/2006/main" xmlns:r="http://schemas.openxmlformats.org/officeDocument/2006/relationships" xmlns:p="http://schemas.openxmlformats.org/presentationml/2006/main">
   <p:cSld>
     <p:spTree>
@@ -14108,7 +13835,7 @@
 </p:sld>
 </file>
 
-<file path=ppt/slides/slide6.xml><?xml version="1.0" encoding="utf-8"?>
+<file path=ppt/slides/slide5.xml><?xml version="1.0" encoding="utf-8"?>
 <p:sld xmlns:a="http://schemas.openxmlformats.org/drawingml/2006/main" xmlns:r="http://schemas.openxmlformats.org/officeDocument/2006/relationships" xmlns:p="http://schemas.openxmlformats.org/presentationml/2006/main">
   <p:cSld>
     <p:spTree>
@@ -14260,7 +13987,7 @@
 </p:sld>
 </file>
 
-<file path=ppt/slides/slide7.xml><?xml version="1.0" encoding="utf-8"?>
+<file path=ppt/slides/slide6.xml><?xml version="1.0" encoding="utf-8"?>
 <p:sld xmlns:a="http://schemas.openxmlformats.org/drawingml/2006/main" xmlns:r="http://schemas.openxmlformats.org/officeDocument/2006/relationships" xmlns:p="http://schemas.openxmlformats.org/presentationml/2006/main">
   <p:cSld>
     <p:spTree>
@@ -14459,7 +14186,7 @@
 </p:sld>
 </file>
 
-<file path=ppt/slides/slide8.xml><?xml version="1.0" encoding="utf-8"?>
+<file path=ppt/slides/slide7.xml><?xml version="1.0" encoding="utf-8"?>
 <p:sld xmlns:a="http://schemas.openxmlformats.org/drawingml/2006/main" xmlns:r="http://schemas.openxmlformats.org/officeDocument/2006/relationships" xmlns:p="http://schemas.openxmlformats.org/presentationml/2006/main">
   <p:cSld>
     <p:spTree>
@@ -14894,7 +14621,7 @@
                 </a:solidFill>
                 <a:latin typeface="+mj-lt"/>
               </a:rPr>
-              <a:t>Q   Query                     “Light yellow with a bit of dark orange.”</a:t>
+              <a:t>Q   Query                     “Fly or flies – moves through the air”</a:t>
             </a:r>
           </a:p>
         </p:txBody>
@@ -14934,7 +14661,7 @@
                 </a:solidFill>
                 <a:latin typeface="+mj-lt"/>
               </a:rPr>
-              <a:t>K    Key                          Descriptive label on each can of paint</a:t>
+              <a:t>K    Key                          Descriptive label on each word</a:t>
             </a:r>
           </a:p>
         </p:txBody>
@@ -14974,7 +14701,7 @@
                 </a:solidFill>
                 <a:latin typeface="+mj-lt"/>
               </a:rPr>
-              <a:t>V    Value                      Actual contents of each can of paint</a:t>
+              <a:t>V    Value                      Actual contents of each word</a:t>
             </a:r>
           </a:p>
         </p:txBody>
@@ -15196,6 +14923,59 @@
                       </p:childTnLst>
                     </p:cTn>
                   </p:par>
+                  <p:par>
+                    <p:cTn id="18" fill="hold">
+                      <p:stCondLst>
+                        <p:cond delay="indefinite"/>
+                      </p:stCondLst>
+                      <p:childTnLst>
+                        <p:par>
+                          <p:cTn id="19" fill="hold">
+                            <p:stCondLst>
+                              <p:cond delay="0"/>
+                            </p:stCondLst>
+                            <p:childTnLst>
+                              <p:par>
+                                <p:cTn id="20" presetID="10" presetClass="entr" presetSubtype="0" fill="hold" grpId="0" nodeType="clickEffect">
+                                  <p:stCondLst>
+                                    <p:cond delay="0"/>
+                                  </p:stCondLst>
+                                  <p:childTnLst>
+                                    <p:set>
+                                      <p:cBhvr>
+                                        <p:cTn id="21" dur="1" fill="hold">
+                                          <p:stCondLst>
+                                            <p:cond delay="0"/>
+                                          </p:stCondLst>
+                                        </p:cTn>
+                                        <p:tgtEl>
+                                          <p:spTgt spid="9"/>
+                                        </p:tgtEl>
+                                        <p:attrNameLst>
+                                          <p:attrName>style.visibility</p:attrName>
+                                        </p:attrNameLst>
+                                      </p:cBhvr>
+                                      <p:to>
+                                        <p:strVal val="visible"/>
+                                      </p:to>
+                                    </p:set>
+                                    <p:animEffect transition="in" filter="fade">
+                                      <p:cBhvr>
+                                        <p:cTn id="22" dur="500"/>
+                                        <p:tgtEl>
+                                          <p:spTgt spid="9"/>
+                                        </p:tgtEl>
+                                      </p:cBhvr>
+                                    </p:animEffect>
+                                  </p:childTnLst>
+                                </p:cTn>
+                              </p:par>
+                            </p:childTnLst>
+                          </p:cTn>
+                        </p:par>
+                      </p:childTnLst>
+                    </p:cTn>
+                  </p:par>
                 </p:childTnLst>
               </p:cTn>
               <p:prevCondLst>
@@ -15221,12 +15001,13 @@
       <p:bldP spid="2" grpId="0"/>
       <p:bldP spid="6" grpId="0"/>
       <p:bldP spid="7" grpId="0"/>
+      <p:bldP spid="9" grpId="0"/>
     </p:bldLst>
   </p:timing>
 </p:sld>
 </file>
 
-<file path=ppt/slides/slide9.xml><?xml version="1.0" encoding="utf-8"?>
+<file path=ppt/slides/slide8.xml><?xml version="1.0" encoding="utf-8"?>
 <p:sld xmlns:a="http://schemas.openxmlformats.org/drawingml/2006/main" xmlns:r="http://schemas.openxmlformats.org/officeDocument/2006/relationships" xmlns:p="http://schemas.openxmlformats.org/presentationml/2006/main">
   <p:cSld>
     <p:spTree>
@@ -15660,6 +15441,449 @@
     <p:extLst>
       <p:ext uri="{BB962C8B-B14F-4D97-AF65-F5344CB8AC3E}">
         <p14:creationId xmlns:p14="http://schemas.microsoft.com/office/powerpoint/2010/main" val="1874409243"/>
+      </p:ext>
+    </p:extLst>
+  </p:cSld>
+  <p:clrMapOvr>
+    <a:masterClrMapping/>
+  </p:clrMapOvr>
+</p:sld>
+</file>
+
+<file path=ppt/slides/slide9.xml><?xml version="1.0" encoding="utf-8"?>
+<p:sld xmlns:a="http://schemas.openxmlformats.org/drawingml/2006/main" xmlns:r="http://schemas.openxmlformats.org/officeDocument/2006/relationships" xmlns:p="http://schemas.openxmlformats.org/presentationml/2006/main">
+  <p:cSld>
+    <p:spTree>
+      <p:nvGrpSpPr>
+        <p:cNvPr id="1" name=""/>
+        <p:cNvGrpSpPr/>
+        <p:nvPr/>
+      </p:nvGrpSpPr>
+      <p:grpSpPr>
+        <a:xfrm>
+          <a:off x="0" y="0"/>
+          <a:ext cx="0" cy="0"/>
+          <a:chOff x="0" y="0"/>
+          <a:chExt cx="0" cy="0"/>
+        </a:xfrm>
+      </p:grpSpPr>
+      <p:pic>
+        <p:nvPicPr>
+          <p:cNvPr id="9" name="Picture 8">
+            <a:extLst>
+              <a:ext uri="{FF2B5EF4-FFF2-40B4-BE49-F238E27FC236}">
+                <a16:creationId xmlns:a16="http://schemas.microsoft.com/office/drawing/2014/main" id="{9C45DAD3-D954-0FF1-8F79-DBF6100A0C2F}"/>
+              </a:ext>
+            </a:extLst>
+          </p:cNvPr>
+          <p:cNvPicPr>
+            <a:picLocks noChangeAspect="1"/>
+          </p:cNvPicPr>
+          <p:nvPr/>
+        </p:nvPicPr>
+        <p:blipFill>
+          <a:blip r:embed="rId3"/>
+          <a:stretch>
+            <a:fillRect/>
+          </a:stretch>
+        </p:blipFill>
+        <p:spPr>
+          <a:xfrm>
+            <a:off x="1946275" y="117475"/>
+            <a:ext cx="8299450" cy="6623050"/>
+          </a:xfrm>
+          <a:prstGeom prst="rect">
+            <a:avLst/>
+          </a:prstGeom>
+        </p:spPr>
+      </p:pic>
+      <p:sp>
+        <p:nvSpPr>
+          <p:cNvPr id="3" name="TextBox 2">
+            <a:extLst>
+              <a:ext uri="{FF2B5EF4-FFF2-40B4-BE49-F238E27FC236}">
+                <a16:creationId xmlns:a16="http://schemas.microsoft.com/office/drawing/2014/main" id="{11F9E0E5-C8EC-B69F-C9F3-E277ADA47CB8}"/>
+              </a:ext>
+            </a:extLst>
+          </p:cNvPr>
+          <p:cNvSpPr txBox="1"/>
+          <p:nvPr/>
+        </p:nvSpPr>
+        <p:spPr>
+          <a:xfrm>
+            <a:off x="0" y="6550223"/>
+            <a:ext cx="12192000" cy="307777"/>
+          </a:xfrm>
+          <a:prstGeom prst="rect">
+            <a:avLst/>
+          </a:prstGeom>
+          <a:noFill/>
+        </p:spPr>
+        <p:txBody>
+          <a:bodyPr wrap="square" rtlCol="0">
+            <a:spAutoFit/>
+          </a:bodyPr>
+          <a:lstStyle/>
+          <a:p>
+            <a:r>
+              <a:rPr lang="en-US" sz="1400" dirty="0">
+                <a:solidFill>
+                  <a:schemeClr val="tx1">
+                    <a:lumMod val="65000"/>
+                    <a:lumOff val="35000"/>
+                  </a:schemeClr>
+                </a:solidFill>
+                <a:latin typeface="+mj-lt"/>
+                <a:ea typeface="Verdana" panose="020B0604030504040204" pitchFamily="34" charset="0"/>
+              </a:rPr>
+              <a:t>Story Source: Glassner, A. (2021). </a:t>
+            </a:r>
+            <a:r>
+              <a:rPr lang="en-US" sz="1400" i="1" dirty="0">
+                <a:solidFill>
+                  <a:schemeClr val="tx1">
+                    <a:lumMod val="65000"/>
+                    <a:lumOff val="35000"/>
+                  </a:schemeClr>
+                </a:solidFill>
+                <a:latin typeface="+mj-lt"/>
+                <a:ea typeface="Verdana" panose="020B0604030504040204" pitchFamily="34" charset="0"/>
+              </a:rPr>
+              <a:t>Deep learning: A visual approach</a:t>
+            </a:r>
+            <a:r>
+              <a:rPr lang="en-US" sz="1400" dirty="0">
+                <a:solidFill>
+                  <a:schemeClr val="tx1">
+                    <a:lumMod val="65000"/>
+                    <a:lumOff val="35000"/>
+                  </a:schemeClr>
+                </a:solidFill>
+                <a:latin typeface="+mj-lt"/>
+                <a:ea typeface="Verdana" panose="020B0604030504040204" pitchFamily="34" charset="0"/>
+              </a:rPr>
+              <a:t>. </a:t>
+            </a:r>
+            <a:r>
+              <a:rPr lang="en-US" sz="1400" b="0" i="0" dirty="0">
+                <a:solidFill>
+                  <a:schemeClr val="tx1">
+                    <a:lumMod val="65000"/>
+                    <a:lumOff val="35000"/>
+                  </a:schemeClr>
+                </a:solidFill>
+                <a:effectLst/>
+                <a:latin typeface="+mj-lt"/>
+                <a:ea typeface="Verdana" panose="020B0604030504040204" pitchFamily="34" charset="0"/>
+              </a:rPr>
+              <a:t>San Francisco, CA: No Starch Press. (Chapter </a:t>
+            </a:r>
+            <a:r>
+              <a:rPr lang="en-US" sz="1400" dirty="0">
+                <a:solidFill>
+                  <a:schemeClr val="tx1">
+                    <a:lumMod val="65000"/>
+                    <a:lumOff val="35000"/>
+                  </a:schemeClr>
+                </a:solidFill>
+                <a:latin typeface="+mj-lt"/>
+                <a:ea typeface="Verdana" panose="020B0604030504040204" pitchFamily="34" charset="0"/>
+              </a:rPr>
+              <a:t>20</a:t>
+            </a:r>
+            <a:r>
+              <a:rPr lang="en-US" sz="1400" b="0" i="0" dirty="0">
+                <a:solidFill>
+                  <a:schemeClr val="tx1">
+                    <a:lumMod val="65000"/>
+                    <a:lumOff val="35000"/>
+                  </a:schemeClr>
+                </a:solidFill>
+                <a:effectLst/>
+                <a:latin typeface="+mj-lt"/>
+                <a:ea typeface="Verdana" panose="020B0604030504040204" pitchFamily="34" charset="0"/>
+              </a:rPr>
+              <a:t>)</a:t>
+            </a:r>
+            <a:endParaRPr lang="en-US" sz="1400" dirty="0">
+              <a:solidFill>
+                <a:schemeClr val="tx1">
+                  <a:lumMod val="65000"/>
+                  <a:lumOff val="35000"/>
+                </a:schemeClr>
+              </a:solidFill>
+              <a:latin typeface="+mj-lt"/>
+              <a:ea typeface="Verdana" panose="020B0604030504040204" pitchFamily="34" charset="0"/>
+            </a:endParaRPr>
+          </a:p>
+        </p:txBody>
+      </p:sp>
+      <p:graphicFrame>
+        <p:nvGraphicFramePr>
+          <p:cNvPr id="4" name="Table 9">
+            <a:extLst>
+              <a:ext uri="{FF2B5EF4-FFF2-40B4-BE49-F238E27FC236}">
+                <a16:creationId xmlns:a16="http://schemas.microsoft.com/office/drawing/2014/main" id="{D9A2C165-E4BD-3D78-6733-92FC682CF65E}"/>
+              </a:ext>
+            </a:extLst>
+          </p:cNvPr>
+          <p:cNvGraphicFramePr>
+            <a:graphicFrameLocks noGrp="1"/>
+          </p:cNvGraphicFramePr>
+          <p:nvPr>
+            <p:extLst>
+              <p:ext uri="{D42A27DB-BD31-4B8C-83A1-F6EECF244321}">
+                <p14:modId xmlns:p14="http://schemas.microsoft.com/office/powerpoint/2010/main" val="1192574315"/>
+              </p:ext>
+            </p:extLst>
+          </p:nvPr>
+        </p:nvGraphicFramePr>
+        <p:xfrm>
+          <a:off x="95693" y="165817"/>
+          <a:ext cx="1329070" cy="1490816"/>
+        </p:xfrm>
+        <a:graphic>
+          <a:graphicData uri="http://schemas.openxmlformats.org/drawingml/2006/table">
+            <a:tbl>
+              <a:tblPr firstRow="1" bandRow="1">
+                <a:tableStyleId>{5940675A-B579-460E-94D1-54222C63F5DA}</a:tableStyleId>
+              </a:tblPr>
+              <a:tblGrid>
+                <a:gridCol w="312725">
+                  <a:extLst>
+                    <a:ext uri="{9D8B030D-6E8A-4147-A177-3AD203B41FA5}">
+                      <a16:colId xmlns:a16="http://schemas.microsoft.com/office/drawing/2014/main" val="2256347462"/>
+                    </a:ext>
+                  </a:extLst>
+                </a:gridCol>
+                <a:gridCol w="1016345">
+                  <a:extLst>
+                    <a:ext uri="{9D8B030D-6E8A-4147-A177-3AD203B41FA5}">
+                      <a16:colId xmlns:a16="http://schemas.microsoft.com/office/drawing/2014/main" val="1000086060"/>
+                    </a:ext>
+                  </a:extLst>
+                </a:gridCol>
+              </a:tblGrid>
+              <a:tr h="372704">
+                <a:tc>
+                  <a:txBody>
+                    <a:bodyPr/>
+                    <a:lstStyle/>
+                    <a:p>
+                      <a:r>
+                        <a:rPr lang="en-US" sz="1800" kern="1200" dirty="0">
+                          <a:solidFill>
+                            <a:srgbClr val="B71E56"/>
+                          </a:solidFill>
+                          <a:latin typeface="+mj-lt"/>
+                          <a:ea typeface="+mn-ea"/>
+                          <a:cs typeface="+mn-cs"/>
+                        </a:rPr>
+                        <a:t>Q</a:t>
+                      </a:r>
+                      <a:endParaRPr lang="en-US" sz="1800" dirty="0">
+                        <a:latin typeface="+mj-lt"/>
+                      </a:endParaRPr>
+                    </a:p>
+                  </a:txBody>
+                  <a:tcPr/>
+                </a:tc>
+                <a:tc>
+                  <a:txBody>
+                    <a:bodyPr/>
+                    <a:lstStyle/>
+                    <a:p>
+                      <a:r>
+                        <a:rPr lang="en-US" sz="1800" kern="1200" dirty="0">
+                          <a:solidFill>
+                            <a:srgbClr val="B71E56"/>
+                          </a:solidFill>
+                          <a:latin typeface="+mj-lt"/>
+                          <a:ea typeface="+mn-ea"/>
+                          <a:cs typeface="+mn-cs"/>
+                        </a:rPr>
+                        <a:t>Query</a:t>
+                      </a:r>
+                      <a:endParaRPr lang="en-US" sz="1800" dirty="0">
+                        <a:latin typeface="+mj-lt"/>
+                      </a:endParaRPr>
+                    </a:p>
+                  </a:txBody>
+                  <a:tcPr/>
+                </a:tc>
+                <a:extLst>
+                  <a:ext uri="{0D108BD9-81ED-4DB2-BD59-A6C34878D82A}">
+                    <a16:rowId xmlns:a16="http://schemas.microsoft.com/office/drawing/2014/main" val="1110988348"/>
+                  </a:ext>
+                </a:extLst>
+              </a:tr>
+              <a:tr h="372704">
+                <a:tc>
+                  <a:txBody>
+                    <a:bodyPr/>
+                    <a:lstStyle/>
+                    <a:p>
+                      <a:r>
+                        <a:rPr lang="en-US" sz="1800" kern="1200" dirty="0">
+                          <a:solidFill>
+                            <a:srgbClr val="2D83B7"/>
+                          </a:solidFill>
+                          <a:latin typeface="+mj-lt"/>
+                          <a:ea typeface="+mn-ea"/>
+                          <a:cs typeface="+mn-cs"/>
+                        </a:rPr>
+                        <a:t>K</a:t>
+                      </a:r>
+                      <a:endParaRPr lang="en-US" sz="1800" dirty="0">
+                        <a:latin typeface="+mj-lt"/>
+                      </a:endParaRPr>
+                    </a:p>
+                  </a:txBody>
+                  <a:tcPr/>
+                </a:tc>
+                <a:tc>
+                  <a:txBody>
+                    <a:bodyPr/>
+                    <a:lstStyle/>
+                    <a:p>
+                      <a:r>
+                        <a:rPr lang="en-US" sz="1800" kern="1200" dirty="0">
+                          <a:solidFill>
+                            <a:srgbClr val="2D83B7"/>
+                          </a:solidFill>
+                          <a:latin typeface="+mj-lt"/>
+                          <a:ea typeface="+mn-ea"/>
+                          <a:cs typeface="+mn-cs"/>
+                        </a:rPr>
+                        <a:t>Key </a:t>
+                      </a:r>
+                      <a:endParaRPr lang="en-US" sz="1800" dirty="0">
+                        <a:latin typeface="+mj-lt"/>
+                      </a:endParaRPr>
+                    </a:p>
+                  </a:txBody>
+                  <a:tcPr/>
+                </a:tc>
+                <a:extLst>
+                  <a:ext uri="{0D108BD9-81ED-4DB2-BD59-A6C34878D82A}">
+                    <a16:rowId xmlns:a16="http://schemas.microsoft.com/office/drawing/2014/main" val="1982827846"/>
+                  </a:ext>
+                </a:extLst>
+              </a:tr>
+              <a:tr h="372704">
+                <a:tc>
+                  <a:txBody>
+                    <a:bodyPr/>
+                    <a:lstStyle/>
+                    <a:p>
+                      <a:r>
+                        <a:rPr lang="en-US" sz="1800" kern="1200" dirty="0">
+                          <a:solidFill>
+                            <a:srgbClr val="319F48"/>
+                          </a:solidFill>
+                          <a:latin typeface="+mj-lt"/>
+                          <a:ea typeface="+mn-ea"/>
+                          <a:cs typeface="+mn-cs"/>
+                        </a:rPr>
+                        <a:t>V </a:t>
+                      </a:r>
+                      <a:endParaRPr lang="en-US" sz="1800" dirty="0">
+                        <a:latin typeface="+mj-lt"/>
+                      </a:endParaRPr>
+                    </a:p>
+                  </a:txBody>
+                  <a:tcPr/>
+                </a:tc>
+                <a:tc>
+                  <a:txBody>
+                    <a:bodyPr/>
+                    <a:lstStyle/>
+                    <a:p>
+                      <a:r>
+                        <a:rPr lang="en-US" sz="1800" kern="1200" dirty="0">
+                          <a:solidFill>
+                            <a:srgbClr val="319F48"/>
+                          </a:solidFill>
+                          <a:latin typeface="+mj-lt"/>
+                          <a:ea typeface="+mn-ea"/>
+                          <a:cs typeface="+mn-cs"/>
+                        </a:rPr>
+                        <a:t>Value</a:t>
+                      </a:r>
+                      <a:endParaRPr lang="en-US" sz="1800" dirty="0">
+                        <a:latin typeface="+mj-lt"/>
+                      </a:endParaRPr>
+                    </a:p>
+                  </a:txBody>
+                  <a:tcPr/>
+                </a:tc>
+                <a:extLst>
+                  <a:ext uri="{0D108BD9-81ED-4DB2-BD59-A6C34878D82A}">
+                    <a16:rowId xmlns:a16="http://schemas.microsoft.com/office/drawing/2014/main" val="2431682978"/>
+                  </a:ext>
+                </a:extLst>
+              </a:tr>
+              <a:tr h="372704">
+                <a:tc>
+                  <a:txBody>
+                    <a:bodyPr/>
+                    <a:lstStyle/>
+                    <a:p>
+                      <a:r>
+                        <a:rPr lang="en-US" sz="1800" kern="1200" dirty="0">
+                          <a:solidFill>
+                            <a:srgbClr val="93742C"/>
+                          </a:solidFill>
+                          <a:latin typeface="+mj-lt"/>
+                          <a:ea typeface="+mn-ea"/>
+                          <a:cs typeface="+mn-cs"/>
+                        </a:rPr>
+                        <a:t>S</a:t>
+                      </a:r>
+                      <a:endParaRPr lang="en-US" sz="1800" dirty="0">
+                        <a:latin typeface="+mj-lt"/>
+                      </a:endParaRPr>
+                    </a:p>
+                  </a:txBody>
+                  <a:tcPr/>
+                </a:tc>
+                <a:tc>
+                  <a:txBody>
+                    <a:bodyPr/>
+                    <a:lstStyle/>
+                    <a:p>
+                      <a:r>
+                        <a:rPr lang="en-US" sz="1800" kern="1200" dirty="0">
+                          <a:solidFill>
+                            <a:srgbClr val="93742C"/>
+                          </a:solidFill>
+                          <a:latin typeface="+mj-lt"/>
+                          <a:ea typeface="+mn-ea"/>
+                          <a:cs typeface="+mn-cs"/>
+                        </a:rPr>
+                        <a:t>Score</a:t>
+                      </a:r>
+                      <a:endParaRPr lang="en-US" sz="1800" dirty="0">
+                        <a:latin typeface="+mj-lt"/>
+                      </a:endParaRPr>
+                    </a:p>
+                  </a:txBody>
+                  <a:tcPr/>
+                </a:tc>
+                <a:extLst>
+                  <a:ext uri="{0D108BD9-81ED-4DB2-BD59-A6C34878D82A}">
+                    <a16:rowId xmlns:a16="http://schemas.microsoft.com/office/drawing/2014/main" val="3072527918"/>
+                  </a:ext>
+                </a:extLst>
+              </a:tr>
+            </a:tbl>
+          </a:graphicData>
+        </a:graphic>
+      </p:graphicFrame>
+    </p:spTree>
+    <p:extLst>
+      <p:ext uri="{BB962C8B-B14F-4D97-AF65-F5344CB8AC3E}">
+        <p14:creationId xmlns:p14="http://schemas.microsoft.com/office/powerpoint/2010/main" val="4133325865"/>
       </p:ext>
     </p:extLst>
   </p:cSld>

</xml_diff>